<commit_message>
added even more stuff
</commit_message>
<xml_diff>
--- a/GoodEats.pptx
+++ b/GoodEats.pptx
@@ -5,7 +5,7 @@
     <p:sldMasterId id="2147483648" r:id="rId1"/>
   </p:sldMasterIdLst>
   <p:notesMasterIdLst>
-    <p:notesMasterId r:id="rId16"/>
+    <p:notesMasterId r:id="rId15"/>
   </p:notesMasterIdLst>
   <p:sldIdLst>
     <p:sldId id="270" r:id="rId2"/>
@@ -18,10 +18,9 @@
     <p:sldId id="276" r:id="rId9"/>
     <p:sldId id="277" r:id="rId10"/>
     <p:sldId id="279" r:id="rId11"/>
-    <p:sldId id="282" r:id="rId12"/>
+    <p:sldId id="287" r:id="rId12"/>
     <p:sldId id="285" r:id="rId13"/>
     <p:sldId id="278" r:id="rId14"/>
-    <p:sldId id="286" r:id="rId15"/>
   </p:sldIdLst>
   <p:sldSz cx="12192000" cy="6858000"/>
   <p:notesSz cx="6858000" cy="9144000"/>
@@ -5577,7 +5576,7 @@
     </p:spTree>
     <p:extLst>
       <p:ext uri="{BB962C8B-B14F-4D97-AF65-F5344CB8AC3E}">
-        <p14:creationId xmlns:p14="http://schemas.microsoft.com/office/powerpoint/2010/main" val="274084605"/>
+        <p14:creationId xmlns:p14="http://schemas.microsoft.com/office/powerpoint/2010/main" val="25865806"/>
       </p:ext>
     </p:extLst>
   </p:cSld>
@@ -9851,7 +9850,7 @@
           <a:p>
             <a:r>
               <a:rPr lang="en-US" sz="3600" dirty="0"/>
-              <a:t>Initial Analysis</a:t>
+              <a:t>Analysis</a:t>
             </a:r>
           </a:p>
         </p:txBody>
@@ -9875,7 +9874,7 @@
         <p:spPr>
           <a:xfrm>
             <a:off x="518474" y="1774372"/>
-            <a:ext cx="4064409" cy="2754086"/>
+            <a:ext cx="4622238" cy="2754086"/>
           </a:xfrm>
         </p:spPr>
         <p:txBody>
@@ -9886,20 +9885,7 @@
           <a:p>
             <a:r>
               <a:rPr lang="en-US" sz="1800" dirty="0"/>
-              <a:t>Average health grade  </a:t>
-            </a:r>
-          </a:p>
-          <a:p>
-            <a:pPr lvl="1"/>
-            <a:r>
-              <a:rPr lang="en-US" sz="1400" dirty="0"/>
-              <a:t>A  (95% of the restaurants)</a:t>
-            </a:r>
-          </a:p>
-          <a:p>
-            <a:r>
-              <a:rPr lang="en-US" sz="1800" dirty="0"/>
-              <a:t>Average number of review</a:t>
+              <a:t>Average number of reviews per restaurant</a:t>
             </a:r>
           </a:p>
           <a:p>
@@ -9920,6 +9906,32 @@
             <a:r>
               <a:rPr lang="en-US" sz="1400" dirty="0"/>
               <a:t>???</a:t>
+            </a:r>
+          </a:p>
+          <a:p>
+            <a:r>
+              <a:rPr lang="en-US" sz="1800" dirty="0"/>
+              <a:t>Health grade impact on popularity</a:t>
+            </a:r>
+          </a:p>
+          <a:p>
+            <a:pPr lvl="1"/>
+            <a:r>
+              <a:rPr lang="en-US" sz="1400" dirty="0"/>
+              <a:t>No</a:t>
+            </a:r>
+          </a:p>
+          <a:p>
+            <a:r>
+              <a:rPr lang="en-US" sz="1800" dirty="0"/>
+              <a:t>Average health grade  </a:t>
+            </a:r>
+          </a:p>
+          <a:p>
+            <a:pPr lvl="1"/>
+            <a:r>
+              <a:rPr lang="en-US" sz="1400" dirty="0"/>
+              <a:t>A  (95% of the restaurants)</a:t>
             </a:r>
           </a:p>
           <a:p>
@@ -10000,449 +10012,6 @@
     <p:bg>
       <p:bgPr>
         <a:solidFill>
-          <a:schemeClr val="bg1">
-            <a:tint val="95000"/>
-            <a:satMod val="170000"/>
-          </a:schemeClr>
-        </a:solidFill>
-        <a:effectLst/>
-      </p:bgPr>
-    </p:bg>
-    <p:spTree>
-      <p:nvGrpSpPr>
-        <p:cNvPr id="1" name=""/>
-        <p:cNvGrpSpPr/>
-        <p:nvPr/>
-      </p:nvGrpSpPr>
-      <p:grpSpPr>
-        <a:xfrm>
-          <a:off x="0" y="0"/>
-          <a:ext cx="0" cy="0"/>
-          <a:chOff x="0" y="0"/>
-          <a:chExt cx="0" cy="0"/>
-        </a:xfrm>
-      </p:grpSpPr>
-      <p:sp>
-        <p:nvSpPr>
-          <p:cNvPr id="2" name="Title 1">
-            <a:extLst>
-              <a:ext uri="{FF2B5EF4-FFF2-40B4-BE49-F238E27FC236}">
-                <a16:creationId xmlns:a16="http://schemas.microsoft.com/office/drawing/2014/main" id="{0358E089-5166-4FB3-A779-5ED36EF883C1}"/>
-              </a:ext>
-            </a:extLst>
-          </p:cNvPr>
-          <p:cNvSpPr>
-            <a:spLocks noGrp="1"/>
-          </p:cNvSpPr>
-          <p:nvPr>
-            <p:ph type="title"/>
-          </p:nvPr>
-        </p:nvSpPr>
-        <p:spPr>
-          <a:xfrm>
-            <a:off x="609601" y="4819963"/>
-            <a:ext cx="10923638" cy="1317643"/>
-          </a:xfrm>
-        </p:spPr>
-        <p:txBody>
-          <a:bodyPr vert="horz" lIns="91440" tIns="45720" rIns="91440" bIns="45720" rtlCol="0" anchor="b">
-            <a:normAutofit/>
-          </a:bodyPr>
-          <a:lstStyle/>
-          <a:p>
-            <a:pPr algn="ctr"/>
-            <a:r>
-              <a:rPr lang="en-US" kern="1200" dirty="0">
-                <a:solidFill>
-                  <a:schemeClr val="tx1"/>
-                </a:solidFill>
-                <a:latin typeface="+mj-lt"/>
-                <a:ea typeface="+mj-ea"/>
-                <a:cs typeface="+mj-cs"/>
-              </a:rPr>
-              <a:t>Yummy In Your Tummy</a:t>
-            </a:r>
-          </a:p>
-        </p:txBody>
-      </p:sp>
-      <p:pic>
-        <p:nvPicPr>
-          <p:cNvPr id="1026" name="Picture 2" descr="Image result for bottega louie logo">
-            <a:extLst>
-              <a:ext uri="{FF2B5EF4-FFF2-40B4-BE49-F238E27FC236}">
-                <a16:creationId xmlns:a16="http://schemas.microsoft.com/office/drawing/2014/main" id="{693EAE08-5374-4A51-8949-669129EA7F51}"/>
-              </a:ext>
-            </a:extLst>
-          </p:cNvPr>
-          <p:cNvPicPr>
-            <a:picLocks noChangeAspect="1" noChangeArrowheads="1"/>
-          </p:cNvPicPr>
-          <p:nvPr/>
-        </p:nvPicPr>
-        <p:blipFill rotWithShape="1">
-          <a:blip r:embed="rId3">
-            <a:extLst>
-              <a:ext uri="{28A0092B-C50C-407E-A947-70E740481C1C}">
-                <a14:useLocalDpi xmlns:a14="http://schemas.microsoft.com/office/drawing/2010/main" val="0"/>
-              </a:ext>
-            </a:extLst>
-          </a:blip>
-          <a:srcRect l="4648" r="4682" b="-2"/>
-          <a:stretch/>
-        </p:blipFill>
-        <p:spPr bwMode="auto">
-          <a:xfrm>
-            <a:off x="20" y="10"/>
-            <a:ext cx="6095974" cy="4252522"/>
-          </a:xfrm>
-          <a:prstGeom prst="rect">
-            <a:avLst/>
-          </a:prstGeom>
-          <a:noFill/>
-          <a:extLst>
-            <a:ext uri="{909E8E84-426E-40DD-AFC4-6F175D3DCCD1}">
-              <a14:hiddenFill xmlns:a14="http://schemas.microsoft.com/office/drawing/2010/main">
-                <a:solidFill>
-                  <a:srgbClr val="FFFFFF"/>
-                </a:solidFill>
-              </a14:hiddenFill>
-            </a:ext>
-          </a:extLst>
-        </p:spPr>
-      </p:pic>
-      <p:pic>
-        <p:nvPicPr>
-          <p:cNvPr id="4" name="Content Placeholder 4">
-            <a:extLst>
-              <a:ext uri="{FF2B5EF4-FFF2-40B4-BE49-F238E27FC236}">
-                <a16:creationId xmlns:a16="http://schemas.microsoft.com/office/drawing/2014/main" id="{DE736FF5-CDE2-4FAB-8B9A-BD7D81742D4A}"/>
-              </a:ext>
-            </a:extLst>
-          </p:cNvPr>
-          <p:cNvPicPr>
-            <a:picLocks noGrp="1" noChangeAspect="1"/>
-          </p:cNvPicPr>
-          <p:nvPr>
-            <p:ph idx="1"/>
-          </p:nvPr>
-        </p:nvPicPr>
-        <p:blipFill rotWithShape="1">
-          <a:blip r:embed="rId4">
-            <a:extLst/>
-          </a:blip>
-          <a:srcRect l="8846" r="10531" b="-1"/>
-          <a:stretch/>
-        </p:blipFill>
-        <p:spPr>
-          <a:xfrm>
-            <a:off x="6095999" y="-681"/>
-            <a:ext cx="6096001" cy="4253215"/>
-          </a:xfrm>
-          <a:prstGeom prst="rect">
-            <a:avLst/>
-          </a:prstGeom>
-        </p:spPr>
-      </p:pic>
-      <p:cxnSp>
-        <p:nvCxnSpPr>
-          <p:cNvPr id="71" name="Straight Connector 70">
-            <a:extLst>
-              <a:ext uri="{FF2B5EF4-FFF2-40B4-BE49-F238E27FC236}">
-                <a16:creationId xmlns:a16="http://schemas.microsoft.com/office/drawing/2014/main" id="{EBAD6A72-88E8-42F7-88B9-CAF744536BE4}"/>
-              </a:ext>
-              <a:ext uri="{C183D7F6-B498-43B3-948B-1728B52AA6E4}">
-                <adec:decorative xmlns:adec="http://schemas.microsoft.com/office/drawing/2017/decorative" val="1"/>
-              </a:ext>
-            </a:extLst>
-          </p:cNvPr>
-          <p:cNvCxnSpPr>
-            <a:cxnSpLocks noGrp="1" noRot="1" noChangeAspect="1" noMove="1" noResize="1" noEditPoints="1" noAdjustHandles="1" noChangeArrowheads="1" noChangeShapeType="1"/>
-          </p:cNvCxnSpPr>
-          <p:nvPr>
-            <p:extLst>
-              <p:ext uri="{386F3935-93C4-4BCD-93E2-E3B085C9AB24}">
-                <p16:designElem xmlns:p16="http://schemas.microsoft.com/office/powerpoint/2015/main" val="1"/>
-              </p:ext>
-            </p:extLst>
-          </p:nvPr>
-        </p:nvCxnSpPr>
-        <p:spPr>
-          <a:xfrm>
-            <a:off x="6096000" y="-680"/>
-            <a:ext cx="0" cy="4242816"/>
-          </a:xfrm>
-          <a:prstGeom prst="line">
-            <a:avLst/>
-          </a:prstGeom>
-          <a:ln w="101600">
-            <a:solidFill>
-              <a:schemeClr val="tx1"/>
-            </a:solidFill>
-          </a:ln>
-        </p:spPr>
-        <p:style>
-          <a:lnRef idx="1">
-            <a:schemeClr val="accent1"/>
-          </a:lnRef>
-          <a:fillRef idx="0">
-            <a:schemeClr val="accent1"/>
-          </a:fillRef>
-          <a:effectRef idx="0">
-            <a:schemeClr val="accent1"/>
-          </a:effectRef>
-          <a:fontRef idx="minor">
-            <a:schemeClr val="tx1"/>
-          </a:fontRef>
-        </p:style>
-      </p:cxnSp>
-      <p:cxnSp>
-        <p:nvCxnSpPr>
-          <p:cNvPr id="73" name="Straight Connector 72">
-            <a:extLst>
-              <a:ext uri="{FF2B5EF4-FFF2-40B4-BE49-F238E27FC236}">
-                <a16:creationId xmlns:a16="http://schemas.microsoft.com/office/drawing/2014/main" id="{C800968E-0A99-46C4-A9B2-6A63AC66F4B0}"/>
-              </a:ext>
-              <a:ext uri="{C183D7F6-B498-43B3-948B-1728B52AA6E4}">
-                <adec:decorative xmlns:adec="http://schemas.microsoft.com/office/drawing/2017/decorative" val="1"/>
-              </a:ext>
-            </a:extLst>
-          </p:cNvPr>
-          <p:cNvCxnSpPr>
-            <a:cxnSpLocks noGrp="1" noRot="1" noChangeAspect="1" noMove="1" noResize="1" noEditPoints="1" noAdjustHandles="1" noChangeArrowheads="1" noChangeShapeType="1"/>
-          </p:cNvCxnSpPr>
-          <p:nvPr>
-            <p:extLst>
-              <p:ext uri="{386F3935-93C4-4BCD-93E2-E3B085C9AB24}">
-                <p16:designElem xmlns:p16="http://schemas.microsoft.com/office/powerpoint/2015/main" val="1"/>
-              </p:ext>
-            </p:extLst>
-          </p:nvPr>
-        </p:nvCxnSpPr>
-        <p:spPr>
-          <a:xfrm>
-            <a:off x="-2" y="4242136"/>
-            <a:ext cx="12192002" cy="0"/>
-          </a:xfrm>
-          <a:prstGeom prst="line">
-            <a:avLst/>
-          </a:prstGeom>
-          <a:ln w="101600">
-            <a:solidFill>
-              <a:schemeClr val="tx1"/>
-            </a:solidFill>
-          </a:ln>
-        </p:spPr>
-        <p:style>
-          <a:lnRef idx="1">
-            <a:schemeClr val="accent1"/>
-          </a:lnRef>
-          <a:fillRef idx="0">
-            <a:schemeClr val="accent1"/>
-          </a:fillRef>
-          <a:effectRef idx="0">
-            <a:schemeClr val="accent1"/>
-          </a:effectRef>
-          <a:fontRef idx="minor">
-            <a:schemeClr val="tx1"/>
-          </a:fontRef>
-        </p:style>
-      </p:cxnSp>
-      <p:pic>
-        <p:nvPicPr>
-          <p:cNvPr id="11" name="Picture 10">
-            <a:extLst>
-              <a:ext uri="{FF2B5EF4-FFF2-40B4-BE49-F238E27FC236}">
-                <a16:creationId xmlns:a16="http://schemas.microsoft.com/office/drawing/2014/main" id="{689D83A3-BC96-4F2E-BDFE-ED015DBC75FF}"/>
-              </a:ext>
-            </a:extLst>
-          </p:cNvPr>
-          <p:cNvPicPr>
-            <a:picLocks noChangeAspect="1"/>
-          </p:cNvPicPr>
-          <p:nvPr/>
-        </p:nvPicPr>
-        <p:blipFill>
-          <a:blip r:embed="rId5"/>
-          <a:stretch>
-            <a:fillRect/>
-          </a:stretch>
-        </p:blipFill>
-        <p:spPr>
-          <a:xfrm>
-            <a:off x="2932771" y="1410631"/>
-            <a:ext cx="5334558" cy="3877836"/>
-          </a:xfrm>
-          <a:prstGeom prst="rect">
-            <a:avLst/>
-          </a:prstGeom>
-        </p:spPr>
-      </p:pic>
-    </p:spTree>
-    <p:extLst>
-      <p:ext uri="{BB962C8B-B14F-4D97-AF65-F5344CB8AC3E}">
-        <p14:creationId xmlns:p14="http://schemas.microsoft.com/office/powerpoint/2010/main" val="4262776315"/>
-      </p:ext>
-    </p:extLst>
-  </p:cSld>
-  <p:clrMapOvr>
-    <a:overrideClrMapping bg1="dk1" tx1="lt1" bg2="dk2" tx2="lt2" accent1="accent1" accent2="accent2" accent3="accent3" accent4="accent4" accent5="accent5" accent6="accent6" hlink="hlink" folHlink="folHlink"/>
-  </p:clrMapOvr>
-  <p:timing>
-    <p:tnLst>
-      <p:par>
-        <p:cTn id="1" dur="indefinite" restart="never" nodeType="tmRoot">
-          <p:childTnLst>
-            <p:seq concurrent="1" nextAc="seek">
-              <p:cTn id="2" dur="indefinite" nodeType="mainSeq">
-                <p:childTnLst>
-                  <p:par>
-                    <p:cTn id="3" fill="hold">
-                      <p:stCondLst>
-                        <p:cond delay="indefinite"/>
-                        <p:cond evt="onBegin" delay="0">
-                          <p:tn val="2"/>
-                        </p:cond>
-                      </p:stCondLst>
-                      <p:childTnLst>
-                        <p:par>
-                          <p:cTn id="4" fill="hold">
-                            <p:stCondLst>
-                              <p:cond delay="0"/>
-                            </p:stCondLst>
-                            <p:childTnLst>
-                              <p:par>
-                                <p:cTn id="5" presetID="1" presetClass="exit" presetSubtype="0" fill="hold" nodeType="withEffect">
-                                  <p:stCondLst>
-                                    <p:cond delay="0"/>
-                                  </p:stCondLst>
-                                  <p:childTnLst>
-                                    <p:set>
-                                      <p:cBhvr>
-                                        <p:cTn id="6" dur="1" fill="hold">
-                                          <p:stCondLst>
-                                            <p:cond delay="499"/>
-                                          </p:stCondLst>
-                                        </p:cTn>
-                                        <p:tgtEl>
-                                          <p:spTgt spid="11"/>
-                                        </p:tgtEl>
-                                        <p:attrNameLst>
-                                          <p:attrName>style.visibility</p:attrName>
-                                        </p:attrNameLst>
-                                      </p:cBhvr>
-                                      <p:to>
-                                        <p:strVal val="hidden"/>
-                                      </p:to>
-                                    </p:set>
-                                  </p:childTnLst>
-                                </p:cTn>
-                              </p:par>
-                            </p:childTnLst>
-                          </p:cTn>
-                        </p:par>
-                      </p:childTnLst>
-                    </p:cTn>
-                  </p:par>
-                </p:childTnLst>
-              </p:cTn>
-              <p:prevCondLst>
-                <p:cond evt="onPrev" delay="0">
-                  <p:tgtEl>
-                    <p:sldTgt/>
-                  </p:tgtEl>
-                </p:cond>
-              </p:prevCondLst>
-              <p:nextCondLst>
-                <p:cond evt="onNext" delay="0">
-                  <p:tgtEl>
-                    <p:sldTgt/>
-                  </p:tgtEl>
-                </p:cond>
-              </p:nextCondLst>
-            </p:seq>
-          </p:childTnLst>
-        </p:cTn>
-      </p:par>
-    </p:tnLst>
-  </p:timing>
-</p:sld>
-</file>
-
-<file path=ppt/slides/slide12.xml><?xml version="1.0" encoding="utf-8"?>
-<p:sld xmlns:a="http://schemas.openxmlformats.org/drawingml/2006/main" xmlns:r="http://schemas.openxmlformats.org/officeDocument/2006/relationships" xmlns:p="http://schemas.openxmlformats.org/presentationml/2006/main">
-  <p:cSld>
-    <p:bg>
-      <p:bgPr>
-        <a:solidFill>
-          <a:schemeClr val="bg1"/>
-        </a:solidFill>
-        <a:effectLst/>
-      </p:bgPr>
-    </p:bg>
-    <p:spTree>
-      <p:nvGrpSpPr>
-        <p:cNvPr id="1" name=""/>
-        <p:cNvGrpSpPr/>
-        <p:nvPr/>
-      </p:nvGrpSpPr>
-      <p:grpSpPr>
-        <a:xfrm>
-          <a:off x="0" y="0"/>
-          <a:ext cx="0" cy="0"/>
-          <a:chOff x="0" y="0"/>
-          <a:chExt cx="0" cy="0"/>
-        </a:xfrm>
-      </p:grpSpPr>
-      <p:pic>
-        <p:nvPicPr>
-          <p:cNvPr id="7" name="Content Placeholder 6">
-            <a:extLst>
-              <a:ext uri="{FF2B5EF4-FFF2-40B4-BE49-F238E27FC236}">
-                <a16:creationId xmlns:a16="http://schemas.microsoft.com/office/drawing/2014/main" id="{427AEFFB-C41B-4895-9B46-052A181D8ED9}"/>
-              </a:ext>
-            </a:extLst>
-          </p:cNvPr>
-          <p:cNvPicPr>
-            <a:picLocks noGrp="1" noChangeAspect="1"/>
-          </p:cNvPicPr>
-          <p:nvPr>
-            <p:ph idx="1"/>
-          </p:nvPr>
-        </p:nvPicPr>
-        <p:blipFill rotWithShape="1">
-          <a:blip r:embed="rId3"/>
-          <a:srcRect t="4685" b="5316"/>
-          <a:stretch/>
-        </p:blipFill>
-        <p:spPr>
-          <a:xfrm>
-            <a:off x="20" y="10"/>
-            <a:ext cx="12191980" cy="6857990"/>
-          </a:xfrm>
-          <a:prstGeom prst="rect">
-            <a:avLst/>
-          </a:prstGeom>
-        </p:spPr>
-      </p:pic>
-    </p:spTree>
-    <p:extLst>
-      <p:ext uri="{BB962C8B-B14F-4D97-AF65-F5344CB8AC3E}">
-        <p14:creationId xmlns:p14="http://schemas.microsoft.com/office/powerpoint/2010/main" val="3259678212"/>
-      </p:ext>
-    </p:extLst>
-  </p:cSld>
-  <p:clrMapOvr>
-    <a:masterClrMapping/>
-  </p:clrMapOvr>
-</p:sld>
-</file>
-
-<file path=ppt/slides/slide13.xml><?xml version="1.0" encoding="utf-8"?>
-<p:sld xmlns:a="http://schemas.openxmlformats.org/drawingml/2006/main" xmlns:r="http://schemas.openxmlformats.org/officeDocument/2006/relationships" xmlns:p="http://schemas.openxmlformats.org/presentationml/2006/main">
-  <p:cSld>
-    <p:bg>
-      <p:bgPr>
-        <a:solidFill>
           <a:schemeClr val="bg1"/>
         </a:solidFill>
         <a:effectLst/>
@@ -10464,433 +10033,7 @@
       </p:grpSpPr>
       <p:sp>
         <p:nvSpPr>
-          <p:cNvPr id="14" name="Rectangle 8">
-            <a:extLst>
-              <a:ext uri="{FF2B5EF4-FFF2-40B4-BE49-F238E27FC236}">
-                <a16:creationId xmlns:a16="http://schemas.microsoft.com/office/drawing/2014/main" id="{32BC26D8-82FB-445E-AA49-62A77D7C1EE0}"/>
-              </a:ext>
-              <a:ext uri="{C183D7F6-B498-43B3-948B-1728B52AA6E4}">
-                <adec:decorative xmlns:adec="http://schemas.microsoft.com/office/drawing/2017/decorative" val="1"/>
-              </a:ext>
-            </a:extLst>
-          </p:cNvPr>
-          <p:cNvSpPr>
-            <a:spLocks noGrp="1" noRot="1" noChangeAspect="1" noMove="1" noResize="1" noEditPoints="1" noAdjustHandles="1" noChangeArrowheads="1" noChangeShapeType="1" noTextEdit="1"/>
-          </p:cNvSpPr>
-          <p:nvPr>
-            <p:extLst>
-              <p:ext uri="{386F3935-93C4-4BCD-93E2-E3B085C9AB24}">
-                <p16:designElem xmlns:p16="http://schemas.microsoft.com/office/powerpoint/2015/main" val="1"/>
-              </p:ext>
-            </p:extLst>
-          </p:nvPr>
-        </p:nvSpPr>
-        <p:spPr>
-          <a:xfrm>
-            <a:off x="0" y="0"/>
-            <a:ext cx="12192000" cy="6858000"/>
-          </a:xfrm>
-          <a:prstGeom prst="rect">
-            <a:avLst/>
-          </a:prstGeom>
-          <a:solidFill>
-            <a:srgbClr val="40515F"/>
-          </a:solidFill>
-          <a:ln>
-            <a:noFill/>
-          </a:ln>
-        </p:spPr>
-        <p:style>
-          <a:lnRef idx="2">
-            <a:schemeClr val="accent1">
-              <a:shade val="50000"/>
-            </a:schemeClr>
-          </a:lnRef>
-          <a:fillRef idx="1">
-            <a:schemeClr val="accent1"/>
-          </a:fillRef>
-          <a:effectRef idx="0">
-            <a:schemeClr val="accent1"/>
-          </a:effectRef>
-          <a:fontRef idx="minor">
-            <a:schemeClr val="lt1"/>
-          </a:fontRef>
-        </p:style>
-        <p:txBody>
-          <a:bodyPr rtlCol="0" anchor="ctr"/>
-          <a:lstStyle/>
-          <a:p>
-            <a:pPr algn="ctr"/>
-            <a:endParaRPr lang="en-US"/>
-          </a:p>
-        </p:txBody>
-      </p:sp>
-      <p:sp>
-        <p:nvSpPr>
-          <p:cNvPr id="11" name="Rectangle 10">
-            <a:extLst>
-              <a:ext uri="{FF2B5EF4-FFF2-40B4-BE49-F238E27FC236}">
-                <a16:creationId xmlns:a16="http://schemas.microsoft.com/office/drawing/2014/main" id="{CB44330D-EA18-4254-AA95-EB49948539B8}"/>
-              </a:ext>
-              <a:ext uri="{C183D7F6-B498-43B3-948B-1728B52AA6E4}">
-                <adec:decorative xmlns:adec="http://schemas.microsoft.com/office/drawing/2017/decorative" val="1"/>
-              </a:ext>
-            </a:extLst>
-          </p:cNvPr>
-          <p:cNvSpPr>
-            <a:spLocks noGrp="1" noRot="1" noChangeAspect="1" noMove="1" noResize="1" noEditPoints="1" noAdjustHandles="1" noChangeArrowheads="1" noChangeShapeType="1" noTextEdit="1"/>
-          </p:cNvSpPr>
-          <p:nvPr>
-            <p:extLst>
-              <p:ext uri="{386F3935-93C4-4BCD-93E2-E3B085C9AB24}">
-                <p16:designElem xmlns:p16="http://schemas.microsoft.com/office/powerpoint/2015/main" val="1"/>
-              </p:ext>
-            </p:extLst>
-          </p:nvPr>
-        </p:nvSpPr>
-        <p:spPr>
-          <a:xfrm>
-            <a:off x="477012" y="480060"/>
-            <a:ext cx="11237976" cy="5897880"/>
-          </a:xfrm>
-          <a:prstGeom prst="rect">
-            <a:avLst/>
-          </a:prstGeom>
-          <a:solidFill>
-            <a:srgbClr val="FFFFFF"/>
-          </a:solidFill>
-          <a:ln>
-            <a:noFill/>
-          </a:ln>
-        </p:spPr>
-        <p:style>
-          <a:lnRef idx="2">
-            <a:schemeClr val="accent1">
-              <a:shade val="50000"/>
-            </a:schemeClr>
-          </a:lnRef>
-          <a:fillRef idx="1">
-            <a:schemeClr val="accent1"/>
-          </a:fillRef>
-          <a:effectRef idx="0">
-            <a:schemeClr val="accent1"/>
-          </a:effectRef>
-          <a:fontRef idx="minor">
-            <a:schemeClr val="lt1"/>
-          </a:fontRef>
-        </p:style>
-        <p:txBody>
-          <a:bodyPr rtlCol="0" anchor="ctr"/>
-          <a:lstStyle/>
-          <a:p>
-            <a:pPr algn="ctr"/>
-            <a:endParaRPr lang="en-US"/>
-          </a:p>
-        </p:txBody>
-      </p:sp>
-      <p:pic>
-        <p:nvPicPr>
-          <p:cNvPr id="4" name="Content Placeholder 3">
-            <a:extLst>
-              <a:ext uri="{FF2B5EF4-FFF2-40B4-BE49-F238E27FC236}">
-                <a16:creationId xmlns:a16="http://schemas.microsoft.com/office/drawing/2014/main" id="{F64DEBAE-1891-DB4F-9E5D-210E46C671D9}"/>
-              </a:ext>
-            </a:extLst>
-          </p:cNvPr>
-          <p:cNvPicPr>
-            <a:picLocks noGrp="1" noChangeAspect="1"/>
-          </p:cNvPicPr>
-          <p:nvPr>
-            <p:ph idx="1"/>
-          </p:nvPr>
-        </p:nvPicPr>
-        <p:blipFill>
-          <a:blip r:embed="rId2"/>
-          <a:stretch>
-            <a:fillRect/>
-          </a:stretch>
-        </p:blipFill>
-        <p:spPr>
-          <a:xfrm>
-            <a:off x="2144889" y="643467"/>
-            <a:ext cx="7902221" cy="5571066"/>
-          </a:xfrm>
-          <a:prstGeom prst="rect">
-            <a:avLst/>
-          </a:prstGeom>
-        </p:spPr>
-      </p:pic>
-    </p:spTree>
-    <p:extLst>
-      <p:ext uri="{BB962C8B-B14F-4D97-AF65-F5344CB8AC3E}">
-        <p14:creationId xmlns:p14="http://schemas.microsoft.com/office/powerpoint/2010/main" val="378356620"/>
-      </p:ext>
-    </p:extLst>
-  </p:cSld>
-  <p:clrMapOvr>
-    <a:masterClrMapping/>
-  </p:clrMapOvr>
-</p:sld>
-</file>
-
-<file path=ppt/slides/slide14.xml><?xml version="1.0" encoding="utf-8"?>
-<p:sld xmlns:a="http://schemas.openxmlformats.org/drawingml/2006/main" xmlns:r="http://schemas.openxmlformats.org/officeDocument/2006/relationships" xmlns:p="http://schemas.openxmlformats.org/presentationml/2006/main">
-  <p:cSld>
-    <p:spTree>
-      <p:nvGrpSpPr>
-        <p:cNvPr id="1" name=""/>
-        <p:cNvGrpSpPr/>
-        <p:nvPr/>
-      </p:nvGrpSpPr>
-      <p:grpSpPr>
-        <a:xfrm>
-          <a:off x="0" y="0"/>
-          <a:ext cx="0" cy="0"/>
-          <a:chOff x="0" y="0"/>
-          <a:chExt cx="0" cy="0"/>
-        </a:xfrm>
-      </p:grpSpPr>
-      <p:sp>
-        <p:nvSpPr>
-          <p:cNvPr id="2" name="Title 1">
-            <a:extLst>
-              <a:ext uri="{FF2B5EF4-FFF2-40B4-BE49-F238E27FC236}">
-                <a16:creationId xmlns:a16="http://schemas.microsoft.com/office/drawing/2014/main" id="{4EE28650-336E-485D-977B-B52E1D8A8F7C}"/>
-              </a:ext>
-            </a:extLst>
-          </p:cNvPr>
-          <p:cNvSpPr>
-            <a:spLocks noGrp="1"/>
-          </p:cNvSpPr>
-          <p:nvPr>
-            <p:ph type="title"/>
-          </p:nvPr>
-        </p:nvSpPr>
-        <p:spPr/>
-        <p:txBody>
-          <a:bodyPr/>
-          <a:lstStyle/>
-          <a:p>
-            <a:endParaRPr lang="en-US"/>
-          </a:p>
-        </p:txBody>
-      </p:sp>
-      <p:sp>
-        <p:nvSpPr>
-          <p:cNvPr id="3" name="Picture Placeholder 2">
-            <a:extLst>
-              <a:ext uri="{FF2B5EF4-FFF2-40B4-BE49-F238E27FC236}">
-                <a16:creationId xmlns:a16="http://schemas.microsoft.com/office/drawing/2014/main" id="{A99783F0-2371-4B46-9ABD-07940098A6A2}"/>
-              </a:ext>
-            </a:extLst>
-          </p:cNvPr>
-          <p:cNvSpPr>
-            <a:spLocks noGrp="1"/>
-          </p:cNvSpPr>
-          <p:nvPr>
-            <p:ph type="pic" idx="1"/>
-          </p:nvPr>
-        </p:nvSpPr>
-        <p:spPr/>
-      </p:sp>
-      <p:sp>
-        <p:nvSpPr>
-          <p:cNvPr id="4" name="Text Placeholder 3">
-            <a:extLst>
-              <a:ext uri="{FF2B5EF4-FFF2-40B4-BE49-F238E27FC236}">
-                <a16:creationId xmlns:a16="http://schemas.microsoft.com/office/drawing/2014/main" id="{F9F47FCF-E95C-4C6C-AD98-E65831C70B9E}"/>
-              </a:ext>
-            </a:extLst>
-          </p:cNvPr>
-          <p:cNvSpPr>
-            <a:spLocks noGrp="1"/>
-          </p:cNvSpPr>
-          <p:nvPr>
-            <p:ph type="body" sz="half" idx="2"/>
-          </p:nvPr>
-        </p:nvSpPr>
-        <p:spPr/>
-        <p:txBody>
-          <a:bodyPr/>
-          <a:lstStyle/>
-          <a:p>
-            <a:endParaRPr lang="en-US"/>
-          </a:p>
-        </p:txBody>
-      </p:sp>
-    </p:spTree>
-    <p:extLst>
-      <p:ext uri="{BB962C8B-B14F-4D97-AF65-F5344CB8AC3E}">
-        <p14:creationId xmlns:p14="http://schemas.microsoft.com/office/powerpoint/2010/main" val="2133566541"/>
-      </p:ext>
-    </p:extLst>
-  </p:cSld>
-  <p:clrMapOvr>
-    <a:masterClrMapping/>
-  </p:clrMapOvr>
-</p:sld>
-</file>
-
-<file path=ppt/slides/slide2.xml><?xml version="1.0" encoding="utf-8"?>
-<p:sld xmlns:a="http://schemas.openxmlformats.org/drawingml/2006/main" xmlns:r="http://schemas.openxmlformats.org/officeDocument/2006/relationships" xmlns:p="http://schemas.openxmlformats.org/presentationml/2006/main">
-  <p:cSld>
-    <p:bg>
-      <p:bgPr>
-        <a:solidFill>
-          <a:schemeClr val="bg1">
-            <a:tint val="95000"/>
-            <a:satMod val="170000"/>
-          </a:schemeClr>
-        </a:solidFill>
-        <a:effectLst/>
-      </p:bgPr>
-    </p:bg>
-    <p:spTree>
-      <p:nvGrpSpPr>
-        <p:cNvPr id="1" name=""/>
-        <p:cNvGrpSpPr/>
-        <p:nvPr/>
-      </p:nvGrpSpPr>
-      <p:grpSpPr>
-        <a:xfrm>
-          <a:off x="0" y="0"/>
-          <a:ext cx="0" cy="0"/>
-          <a:chOff x="0" y="0"/>
-          <a:chExt cx="0" cy="0"/>
-        </a:xfrm>
-      </p:grpSpPr>
-      <p:sp>
-        <p:nvSpPr>
-          <p:cNvPr id="2" name="Title 1">
-            <a:extLst>
-              <a:ext uri="{FF2B5EF4-FFF2-40B4-BE49-F238E27FC236}">
-                <a16:creationId xmlns:a16="http://schemas.microsoft.com/office/drawing/2014/main" id="{D0F8E0CA-F887-FD4F-AF4A-B725D0469E93}"/>
-              </a:ext>
-            </a:extLst>
-          </p:cNvPr>
-          <p:cNvSpPr>
-            <a:spLocks noGrp="1"/>
-          </p:cNvSpPr>
-          <p:nvPr>
-            <p:ph type="title"/>
-          </p:nvPr>
-        </p:nvSpPr>
-        <p:spPr>
-          <a:xfrm>
-            <a:off x="655320" y="365125"/>
-            <a:ext cx="9013052" cy="1623312"/>
-          </a:xfrm>
-        </p:spPr>
-        <p:txBody>
-          <a:bodyPr anchor="b">
-            <a:normAutofit/>
-          </a:bodyPr>
-          <a:lstStyle/>
-          <a:p>
-            <a:r>
-              <a:rPr lang="en-US" sz="4000" dirty="0"/>
-              <a:t>Introduction</a:t>
-            </a:r>
-          </a:p>
-        </p:txBody>
-      </p:sp>
-      <p:sp>
-        <p:nvSpPr>
-          <p:cNvPr id="3" name="Content Placeholder 2">
-            <a:extLst>
-              <a:ext uri="{FF2B5EF4-FFF2-40B4-BE49-F238E27FC236}">
-                <a16:creationId xmlns:a16="http://schemas.microsoft.com/office/drawing/2014/main" id="{B2F95D11-F0E2-B641-8750-87735D1C2821}"/>
-              </a:ext>
-            </a:extLst>
-          </p:cNvPr>
-          <p:cNvSpPr>
-            <a:spLocks noGrp="1"/>
-          </p:cNvSpPr>
-          <p:nvPr>
-            <p:ph idx="1"/>
-          </p:nvPr>
-        </p:nvSpPr>
-        <p:spPr>
-          <a:xfrm>
-            <a:off x="655320" y="2112886"/>
-            <a:ext cx="9013052" cy="3858884"/>
-          </a:xfrm>
-        </p:spPr>
-        <p:txBody>
-          <a:bodyPr>
-            <a:normAutofit/>
-          </a:bodyPr>
-          <a:lstStyle/>
-          <a:p>
-            <a:pPr marL="0" indent="0">
-              <a:buNone/>
-            </a:pPr>
-            <a:r>
-              <a:rPr lang="en-US" sz="2000" dirty="0"/>
-              <a:t>For our project, our team decided to work on a topic that is dear to our hearts/stomachs.....food.  This lead to a discussion on which restaurants we liked and hated.  This discussion was what sparked the idea for our project.   </a:t>
-            </a:r>
-          </a:p>
-          <a:p>
-            <a:pPr marL="0" indent="0">
-              <a:buNone/>
-            </a:pPr>
-            <a:r>
-              <a:rPr lang="en-US" sz="2000" dirty="0"/>
-              <a:t>For many of us, we pick a restaurant based on word of mouth or on positive review online.  Earlier this year, Yelp, a popular restaurant review site,  added a restaurants’ health inspection score/grade to the restaurant’s review page. </a:t>
-            </a:r>
-          </a:p>
-          <a:p>
-            <a:pPr marL="0" indent="0">
-              <a:buNone/>
-            </a:pPr>
-            <a:r>
-              <a:rPr lang="en-US" sz="2000" dirty="0"/>
-              <a:t>With this new information now readily available, we wanted to see if this would have an impact on restaurant's popularity. </a:t>
-            </a:r>
-          </a:p>
-        </p:txBody>
-      </p:sp>
-    </p:spTree>
-    <p:extLst>
-      <p:ext uri="{BB962C8B-B14F-4D97-AF65-F5344CB8AC3E}">
-        <p14:creationId xmlns:p14="http://schemas.microsoft.com/office/powerpoint/2010/main" val="4029635826"/>
-      </p:ext>
-    </p:extLst>
-  </p:cSld>
-  <p:clrMapOvr>
-    <a:overrideClrMapping bg1="dk1" tx1="lt1" bg2="dk2" tx2="lt2" accent1="accent1" accent2="accent2" accent3="accent3" accent4="accent4" accent5="accent5" accent6="accent6" hlink="hlink" folHlink="folHlink"/>
-  </p:clrMapOvr>
-</p:sld>
-</file>
-
-<file path=ppt/slides/slide3.xml><?xml version="1.0" encoding="utf-8"?>
-<p:sld xmlns:a="http://schemas.openxmlformats.org/drawingml/2006/main" xmlns:r="http://schemas.openxmlformats.org/officeDocument/2006/relationships" xmlns:p="http://schemas.openxmlformats.org/presentationml/2006/main">
-  <p:cSld>
-    <p:bg>
-      <p:bgPr>
-        <a:solidFill>
-          <a:schemeClr val="bg1"/>
-        </a:solidFill>
-        <a:effectLst/>
-      </p:bgPr>
-    </p:bg>
-    <p:spTree>
-      <p:nvGrpSpPr>
-        <p:cNvPr id="1" name=""/>
-        <p:cNvGrpSpPr/>
-        <p:nvPr/>
-      </p:nvGrpSpPr>
-      <p:grpSpPr>
-        <a:xfrm>
-          <a:off x="0" y="0"/>
-          <a:ext cx="0" cy="0"/>
-          <a:chOff x="0" y="0"/>
-          <a:chExt cx="0" cy="0"/>
-        </a:xfrm>
-      </p:grpSpPr>
-      <p:sp>
-        <p:nvSpPr>
-          <p:cNvPr id="40" name="Rectangle 39">
+          <p:cNvPr id="21" name="Rectangle 20">
             <a:extLst>
               <a:ext uri="{FF2B5EF4-FFF2-40B4-BE49-F238E27FC236}">
                 <a16:creationId xmlns:a16="http://schemas.microsoft.com/office/drawing/2014/main" id="{EB181E26-89C4-4A14-92DE-0F4C4B0E9484}"/>
@@ -10953,21 +10096,25 @@
       </p:sp>
       <p:pic>
         <p:nvPicPr>
-          <p:cNvPr id="18" name="Content Placeholder 10">
+          <p:cNvPr id="8" name="Content Placeholder 4">
             <a:extLst>
               <a:ext uri="{FF2B5EF4-FFF2-40B4-BE49-F238E27FC236}">
-                <a16:creationId xmlns:a16="http://schemas.microsoft.com/office/drawing/2014/main" id="{4A0272B9-D0AA-DB47-93F1-5867A6DBEA51}"/>
+                <a16:creationId xmlns:a16="http://schemas.microsoft.com/office/drawing/2014/main" id="{EF97A07D-0B02-4880-B372-DDFB8DD93DEB}"/>
               </a:ext>
             </a:extLst>
           </p:cNvPr>
           <p:cNvPicPr>
-            <a:picLocks noChangeAspect="1"/>
+            <a:picLocks noGrp="1" noChangeAspect="1"/>
           </p:cNvPicPr>
-          <p:nvPr/>
+          <p:nvPr>
+            <p:ph sz="quarter" idx="4"/>
+          </p:nvPr>
         </p:nvPicPr>
         <p:blipFill rotWithShape="1">
-          <a:blip r:embed="rId3"/>
-          <a:srcRect t="3834" r="2" b="15739"/>
+          <a:blip r:embed="rId3">
+            <a:extLst/>
+          </a:blip>
+          <a:srcRect t="18846" r="2" b="1799"/>
           <a:stretch/>
         </p:blipFill>
         <p:spPr>
@@ -11025,24 +10172,30 @@
       </p:pic>
       <p:pic>
         <p:nvPicPr>
-          <p:cNvPr id="33" name="Content Placeholder 11">
+          <p:cNvPr id="11" name="Picture 2" descr="Image result for bottega louie logo">
             <a:extLst>
               <a:ext uri="{FF2B5EF4-FFF2-40B4-BE49-F238E27FC236}">
-                <a16:creationId xmlns:a16="http://schemas.microsoft.com/office/drawing/2014/main" id="{2BA4A8F2-727C-7D4B-AE3D-C8439924C79F}"/>
+                <a16:creationId xmlns:a16="http://schemas.microsoft.com/office/drawing/2014/main" id="{E78CB26A-8F28-4A81-B5FE-37EB08BA99C6}"/>
               </a:ext>
             </a:extLst>
           </p:cNvPr>
           <p:cNvPicPr>
-            <a:picLocks noChangeAspect="1"/>
+            <a:picLocks noChangeAspect="1" noChangeArrowheads="1"/>
           </p:cNvPicPr>
           <p:nvPr/>
         </p:nvPicPr>
         <p:blipFill rotWithShape="1">
-          <a:blip r:embed="rId4"/>
-          <a:srcRect t="16190" r="-2" b="24001"/>
+          <a:blip r:embed="rId4">
+            <a:extLst>
+              <a:ext uri="{28A0092B-C50C-407E-A947-70E740481C1C}">
+                <a14:useLocalDpi xmlns:a14="http://schemas.microsoft.com/office/drawing/2010/main" val="0"/>
+              </a:ext>
+            </a:extLst>
+          </a:blip>
+          <a:srcRect t="24472" r="-2" b="22102"/>
           <a:stretch/>
         </p:blipFill>
-        <p:spPr>
+        <p:spPr bwMode="auto">
           <a:xfrm>
             <a:off x="4791075" y="4357117"/>
             <a:ext cx="7400925" cy="2500884"/>
@@ -11117,11 +10270,21 @@
               </a:path>
             </a:pathLst>
           </a:custGeom>
+          <a:noFill/>
+          <a:extLst>
+            <a:ext uri="{909E8E84-426E-40DD-AFC4-6F175D3DCCD1}">
+              <a14:hiddenFill xmlns:a14="http://schemas.microsoft.com/office/drawing/2010/main">
+                <a:solidFill>
+                  <a:srgbClr val="FFFFFF"/>
+                </a:solidFill>
+              </a14:hiddenFill>
+            </a:ext>
+          </a:extLst>
         </p:spPr>
       </p:pic>
       <p:sp>
         <p:nvSpPr>
-          <p:cNvPr id="42" name="Freeform 37">
+          <p:cNvPr id="23" name="Freeform 37">
             <a:extLst>
               <a:ext uri="{FF2B5EF4-FFF2-40B4-BE49-F238E27FC236}">
                 <a16:creationId xmlns:a16="http://schemas.microsoft.com/office/drawing/2014/main" id="{13958066-7CBD-4B89-8F46-614C4F28BCF9}"/>
@@ -11256,6 +10419,916 @@
       </p:sp>
       <p:sp>
         <p:nvSpPr>
+          <p:cNvPr id="2" name="Title 1">
+            <a:extLst>
+              <a:ext uri="{FF2B5EF4-FFF2-40B4-BE49-F238E27FC236}">
+                <a16:creationId xmlns:a16="http://schemas.microsoft.com/office/drawing/2014/main" id="{259612BE-B08B-4704-8E94-6AC299371443}"/>
+              </a:ext>
+            </a:extLst>
+          </p:cNvPr>
+          <p:cNvSpPr>
+            <a:spLocks noGrp="1"/>
+          </p:cNvSpPr>
+          <p:nvPr>
+            <p:ph type="title"/>
+          </p:nvPr>
+        </p:nvSpPr>
+        <p:spPr>
+          <a:xfrm>
+            <a:off x="838200" y="365125"/>
+            <a:ext cx="10515600" cy="1325563"/>
+          </a:xfrm>
+        </p:spPr>
+        <p:txBody>
+          <a:bodyPr vert="horz" lIns="91440" tIns="45720" rIns="91440" bIns="45720" rtlCol="0" anchor="ctr">
+            <a:normAutofit/>
+          </a:bodyPr>
+          <a:lstStyle/>
+          <a:p>
+            <a:r>
+              <a:rPr lang="en-US" kern="1200" dirty="0">
+                <a:solidFill>
+                  <a:schemeClr val="bg1"/>
+                </a:solidFill>
+                <a:latin typeface="+mj-lt"/>
+                <a:ea typeface="+mj-ea"/>
+                <a:cs typeface="+mj-cs"/>
+              </a:rPr>
+              <a:t>Conclusion</a:t>
+            </a:r>
+          </a:p>
+        </p:txBody>
+      </p:sp>
+      <p:sp>
+        <p:nvSpPr>
+          <p:cNvPr id="13" name="Content Placeholder 12">
+            <a:extLst>
+              <a:ext uri="{FF2B5EF4-FFF2-40B4-BE49-F238E27FC236}">
+                <a16:creationId xmlns:a16="http://schemas.microsoft.com/office/drawing/2014/main" id="{3D593785-F964-4316-B6BA-02809E7D0E38}"/>
+              </a:ext>
+            </a:extLst>
+          </p:cNvPr>
+          <p:cNvSpPr>
+            <a:spLocks noGrp="1"/>
+          </p:cNvSpPr>
+          <p:nvPr>
+            <p:ph sz="half" idx="2"/>
+          </p:nvPr>
+        </p:nvSpPr>
+        <p:spPr>
+          <a:xfrm>
+            <a:off x="506892" y="2628723"/>
+            <a:ext cx="5097779" cy="4065986"/>
+          </a:xfrm>
+        </p:spPr>
+        <p:txBody>
+          <a:bodyPr vert="horz" lIns="91440" tIns="45720" rIns="91440" bIns="45720" rtlCol="0" anchor="t">
+            <a:normAutofit/>
+          </a:bodyPr>
+          <a:lstStyle/>
+          <a:p>
+            <a:r>
+              <a:rPr lang="en-US" sz="2000" dirty="0"/>
+              <a:t>Most popular with high health grade:</a:t>
+            </a:r>
+          </a:p>
+          <a:p>
+            <a:pPr lvl="1"/>
+            <a:r>
+              <a:rPr lang="en-US" sz="1600" dirty="0"/>
+              <a:t>Bottega Louie</a:t>
+            </a:r>
+          </a:p>
+          <a:p>
+            <a:r>
+              <a:rPr lang="en-US" sz="2000" dirty="0"/>
+              <a:t>The average restaurant in LA county has an “A” health grade.</a:t>
+            </a:r>
+          </a:p>
+          <a:p>
+            <a:r>
+              <a:rPr lang="en-US" sz="2000" dirty="0"/>
+              <a:t>Health grade has no impact on a restaurants popularity</a:t>
+            </a:r>
+          </a:p>
+          <a:p>
+            <a:pPr lvl="1"/>
+            <a:r>
+              <a:rPr lang="en-US" sz="1600" dirty="0"/>
+              <a:t>If the food is good, people will come.</a:t>
+            </a:r>
+          </a:p>
+          <a:p>
+            <a:endParaRPr lang="en-US" sz="2000" dirty="0"/>
+          </a:p>
+          <a:p>
+            <a:endParaRPr lang="en-US" sz="2000" dirty="0"/>
+          </a:p>
+        </p:txBody>
+      </p:sp>
+    </p:spTree>
+    <p:extLst>
+      <p:ext uri="{BB962C8B-B14F-4D97-AF65-F5344CB8AC3E}">
+        <p14:creationId xmlns:p14="http://schemas.microsoft.com/office/powerpoint/2010/main" val="2114887114"/>
+      </p:ext>
+    </p:extLst>
+  </p:cSld>
+  <p:clrMapOvr>
+    <a:overrideClrMapping bg1="dk1" tx1="lt1" bg2="dk2" tx2="lt2" accent1="accent1" accent2="accent2" accent3="accent3" accent4="accent4" accent5="accent5" accent6="accent6" hlink="hlink" folHlink="folHlink"/>
+  </p:clrMapOvr>
+</p:sld>
+</file>
+
+<file path=ppt/slides/slide12.xml><?xml version="1.0" encoding="utf-8"?>
+<p:sld xmlns:a="http://schemas.openxmlformats.org/drawingml/2006/main" xmlns:r="http://schemas.openxmlformats.org/officeDocument/2006/relationships" xmlns:p="http://schemas.openxmlformats.org/presentationml/2006/main">
+  <p:cSld>
+    <p:bg>
+      <p:bgPr>
+        <a:solidFill>
+          <a:schemeClr val="bg1"/>
+        </a:solidFill>
+        <a:effectLst/>
+      </p:bgPr>
+    </p:bg>
+    <p:spTree>
+      <p:nvGrpSpPr>
+        <p:cNvPr id="1" name=""/>
+        <p:cNvGrpSpPr/>
+        <p:nvPr/>
+      </p:nvGrpSpPr>
+      <p:grpSpPr>
+        <a:xfrm>
+          <a:off x="0" y="0"/>
+          <a:ext cx="0" cy="0"/>
+          <a:chOff x="0" y="0"/>
+          <a:chExt cx="0" cy="0"/>
+        </a:xfrm>
+      </p:grpSpPr>
+      <p:pic>
+        <p:nvPicPr>
+          <p:cNvPr id="7" name="Content Placeholder 6">
+            <a:extLst>
+              <a:ext uri="{FF2B5EF4-FFF2-40B4-BE49-F238E27FC236}">
+                <a16:creationId xmlns:a16="http://schemas.microsoft.com/office/drawing/2014/main" id="{427AEFFB-C41B-4895-9B46-052A181D8ED9}"/>
+              </a:ext>
+            </a:extLst>
+          </p:cNvPr>
+          <p:cNvPicPr>
+            <a:picLocks noGrp="1" noChangeAspect="1"/>
+          </p:cNvPicPr>
+          <p:nvPr>
+            <p:ph idx="1"/>
+          </p:nvPr>
+        </p:nvPicPr>
+        <p:blipFill rotWithShape="1">
+          <a:blip r:embed="rId3"/>
+          <a:srcRect t="4685" b="5316"/>
+          <a:stretch/>
+        </p:blipFill>
+        <p:spPr>
+          <a:xfrm>
+            <a:off x="20" y="10"/>
+            <a:ext cx="12191980" cy="6857990"/>
+          </a:xfrm>
+          <a:prstGeom prst="rect">
+            <a:avLst/>
+          </a:prstGeom>
+        </p:spPr>
+      </p:pic>
+    </p:spTree>
+    <p:extLst>
+      <p:ext uri="{BB962C8B-B14F-4D97-AF65-F5344CB8AC3E}">
+        <p14:creationId xmlns:p14="http://schemas.microsoft.com/office/powerpoint/2010/main" val="3259678212"/>
+      </p:ext>
+    </p:extLst>
+  </p:cSld>
+  <p:clrMapOvr>
+    <a:masterClrMapping/>
+  </p:clrMapOvr>
+</p:sld>
+</file>
+
+<file path=ppt/slides/slide13.xml><?xml version="1.0" encoding="utf-8"?>
+<p:sld xmlns:a="http://schemas.openxmlformats.org/drawingml/2006/main" xmlns:r="http://schemas.openxmlformats.org/officeDocument/2006/relationships" xmlns:p="http://schemas.openxmlformats.org/presentationml/2006/main">
+  <p:cSld>
+    <p:bg>
+      <p:bgPr>
+        <a:solidFill>
+          <a:schemeClr val="bg1"/>
+        </a:solidFill>
+        <a:effectLst/>
+      </p:bgPr>
+    </p:bg>
+    <p:spTree>
+      <p:nvGrpSpPr>
+        <p:cNvPr id="1" name=""/>
+        <p:cNvGrpSpPr/>
+        <p:nvPr/>
+      </p:nvGrpSpPr>
+      <p:grpSpPr>
+        <a:xfrm>
+          <a:off x="0" y="0"/>
+          <a:ext cx="0" cy="0"/>
+          <a:chOff x="0" y="0"/>
+          <a:chExt cx="0" cy="0"/>
+        </a:xfrm>
+      </p:grpSpPr>
+      <p:sp>
+        <p:nvSpPr>
+          <p:cNvPr id="14" name="Rectangle 8">
+            <a:extLst>
+              <a:ext uri="{FF2B5EF4-FFF2-40B4-BE49-F238E27FC236}">
+                <a16:creationId xmlns:a16="http://schemas.microsoft.com/office/drawing/2014/main" id="{32BC26D8-82FB-445E-AA49-62A77D7C1EE0}"/>
+              </a:ext>
+              <a:ext uri="{C183D7F6-B498-43B3-948B-1728B52AA6E4}">
+                <adec:decorative xmlns:adec="http://schemas.microsoft.com/office/drawing/2017/decorative" val="1"/>
+              </a:ext>
+            </a:extLst>
+          </p:cNvPr>
+          <p:cNvSpPr>
+            <a:spLocks noGrp="1" noRot="1" noChangeAspect="1" noMove="1" noResize="1" noEditPoints="1" noAdjustHandles="1" noChangeArrowheads="1" noChangeShapeType="1" noTextEdit="1"/>
+          </p:cNvSpPr>
+          <p:nvPr>
+            <p:extLst>
+              <p:ext uri="{386F3935-93C4-4BCD-93E2-E3B085C9AB24}">
+                <p16:designElem xmlns:p16="http://schemas.microsoft.com/office/powerpoint/2015/main" val="1"/>
+              </p:ext>
+            </p:extLst>
+          </p:nvPr>
+        </p:nvSpPr>
+        <p:spPr>
+          <a:xfrm>
+            <a:off x="0" y="0"/>
+            <a:ext cx="12192000" cy="6858000"/>
+          </a:xfrm>
+          <a:prstGeom prst="rect">
+            <a:avLst/>
+          </a:prstGeom>
+          <a:solidFill>
+            <a:srgbClr val="40515F"/>
+          </a:solidFill>
+          <a:ln>
+            <a:noFill/>
+          </a:ln>
+        </p:spPr>
+        <p:style>
+          <a:lnRef idx="2">
+            <a:schemeClr val="accent1">
+              <a:shade val="50000"/>
+            </a:schemeClr>
+          </a:lnRef>
+          <a:fillRef idx="1">
+            <a:schemeClr val="accent1"/>
+          </a:fillRef>
+          <a:effectRef idx="0">
+            <a:schemeClr val="accent1"/>
+          </a:effectRef>
+          <a:fontRef idx="minor">
+            <a:schemeClr val="lt1"/>
+          </a:fontRef>
+        </p:style>
+        <p:txBody>
+          <a:bodyPr rtlCol="0" anchor="ctr"/>
+          <a:lstStyle/>
+          <a:p>
+            <a:pPr algn="ctr"/>
+            <a:endParaRPr lang="en-US"/>
+          </a:p>
+        </p:txBody>
+      </p:sp>
+      <p:sp>
+        <p:nvSpPr>
+          <p:cNvPr id="11" name="Rectangle 10">
+            <a:extLst>
+              <a:ext uri="{FF2B5EF4-FFF2-40B4-BE49-F238E27FC236}">
+                <a16:creationId xmlns:a16="http://schemas.microsoft.com/office/drawing/2014/main" id="{CB44330D-EA18-4254-AA95-EB49948539B8}"/>
+              </a:ext>
+              <a:ext uri="{C183D7F6-B498-43B3-948B-1728B52AA6E4}">
+                <adec:decorative xmlns:adec="http://schemas.microsoft.com/office/drawing/2017/decorative" val="1"/>
+              </a:ext>
+            </a:extLst>
+          </p:cNvPr>
+          <p:cNvSpPr>
+            <a:spLocks noGrp="1" noRot="1" noChangeAspect="1" noMove="1" noResize="1" noEditPoints="1" noAdjustHandles="1" noChangeArrowheads="1" noChangeShapeType="1" noTextEdit="1"/>
+          </p:cNvSpPr>
+          <p:nvPr>
+            <p:extLst>
+              <p:ext uri="{386F3935-93C4-4BCD-93E2-E3B085C9AB24}">
+                <p16:designElem xmlns:p16="http://schemas.microsoft.com/office/powerpoint/2015/main" val="1"/>
+              </p:ext>
+            </p:extLst>
+          </p:nvPr>
+        </p:nvSpPr>
+        <p:spPr>
+          <a:xfrm>
+            <a:off x="477012" y="480060"/>
+            <a:ext cx="11237976" cy="5897880"/>
+          </a:xfrm>
+          <a:prstGeom prst="rect">
+            <a:avLst/>
+          </a:prstGeom>
+          <a:solidFill>
+            <a:srgbClr val="FFFFFF"/>
+          </a:solidFill>
+          <a:ln>
+            <a:noFill/>
+          </a:ln>
+        </p:spPr>
+        <p:style>
+          <a:lnRef idx="2">
+            <a:schemeClr val="accent1">
+              <a:shade val="50000"/>
+            </a:schemeClr>
+          </a:lnRef>
+          <a:fillRef idx="1">
+            <a:schemeClr val="accent1"/>
+          </a:fillRef>
+          <a:effectRef idx="0">
+            <a:schemeClr val="accent1"/>
+          </a:effectRef>
+          <a:fontRef idx="minor">
+            <a:schemeClr val="lt1"/>
+          </a:fontRef>
+        </p:style>
+        <p:txBody>
+          <a:bodyPr rtlCol="0" anchor="ctr"/>
+          <a:lstStyle/>
+          <a:p>
+            <a:pPr algn="ctr"/>
+            <a:endParaRPr lang="en-US"/>
+          </a:p>
+        </p:txBody>
+      </p:sp>
+      <p:pic>
+        <p:nvPicPr>
+          <p:cNvPr id="4" name="Content Placeholder 3">
+            <a:extLst>
+              <a:ext uri="{FF2B5EF4-FFF2-40B4-BE49-F238E27FC236}">
+                <a16:creationId xmlns:a16="http://schemas.microsoft.com/office/drawing/2014/main" id="{F64DEBAE-1891-DB4F-9E5D-210E46C671D9}"/>
+              </a:ext>
+            </a:extLst>
+          </p:cNvPr>
+          <p:cNvPicPr>
+            <a:picLocks noGrp="1" noChangeAspect="1"/>
+          </p:cNvPicPr>
+          <p:nvPr>
+            <p:ph idx="1"/>
+          </p:nvPr>
+        </p:nvPicPr>
+        <p:blipFill>
+          <a:blip r:embed="rId2"/>
+          <a:stretch>
+            <a:fillRect/>
+          </a:stretch>
+        </p:blipFill>
+        <p:spPr>
+          <a:xfrm>
+            <a:off x="2144889" y="643467"/>
+            <a:ext cx="7902221" cy="5571066"/>
+          </a:xfrm>
+          <a:prstGeom prst="rect">
+            <a:avLst/>
+          </a:prstGeom>
+        </p:spPr>
+      </p:pic>
+    </p:spTree>
+    <p:extLst>
+      <p:ext uri="{BB962C8B-B14F-4D97-AF65-F5344CB8AC3E}">
+        <p14:creationId xmlns:p14="http://schemas.microsoft.com/office/powerpoint/2010/main" val="378356620"/>
+      </p:ext>
+    </p:extLst>
+  </p:cSld>
+  <p:clrMapOvr>
+    <a:masterClrMapping/>
+  </p:clrMapOvr>
+</p:sld>
+</file>
+
+<file path=ppt/slides/slide2.xml><?xml version="1.0" encoding="utf-8"?>
+<p:sld xmlns:a="http://schemas.openxmlformats.org/drawingml/2006/main" xmlns:r="http://schemas.openxmlformats.org/officeDocument/2006/relationships" xmlns:p="http://schemas.openxmlformats.org/presentationml/2006/main">
+  <p:cSld>
+    <p:bg>
+      <p:bgPr>
+        <a:solidFill>
+          <a:schemeClr val="bg1">
+            <a:tint val="95000"/>
+            <a:satMod val="170000"/>
+          </a:schemeClr>
+        </a:solidFill>
+        <a:effectLst/>
+      </p:bgPr>
+    </p:bg>
+    <p:spTree>
+      <p:nvGrpSpPr>
+        <p:cNvPr id="1" name=""/>
+        <p:cNvGrpSpPr/>
+        <p:nvPr/>
+      </p:nvGrpSpPr>
+      <p:grpSpPr>
+        <a:xfrm>
+          <a:off x="0" y="0"/>
+          <a:ext cx="0" cy="0"/>
+          <a:chOff x="0" y="0"/>
+          <a:chExt cx="0" cy="0"/>
+        </a:xfrm>
+      </p:grpSpPr>
+      <p:sp>
+        <p:nvSpPr>
+          <p:cNvPr id="2" name="Title 1">
+            <a:extLst>
+              <a:ext uri="{FF2B5EF4-FFF2-40B4-BE49-F238E27FC236}">
+                <a16:creationId xmlns:a16="http://schemas.microsoft.com/office/drawing/2014/main" id="{D0F8E0CA-F887-FD4F-AF4A-B725D0469E93}"/>
+              </a:ext>
+            </a:extLst>
+          </p:cNvPr>
+          <p:cNvSpPr>
+            <a:spLocks noGrp="1"/>
+          </p:cNvSpPr>
+          <p:nvPr>
+            <p:ph type="title"/>
+          </p:nvPr>
+        </p:nvSpPr>
+        <p:spPr>
+          <a:xfrm>
+            <a:off x="655320" y="365125"/>
+            <a:ext cx="9013052" cy="1623312"/>
+          </a:xfrm>
+        </p:spPr>
+        <p:txBody>
+          <a:bodyPr anchor="b">
+            <a:normAutofit/>
+          </a:bodyPr>
+          <a:lstStyle/>
+          <a:p>
+            <a:r>
+              <a:rPr lang="en-US" sz="4000" dirty="0"/>
+              <a:t>Introduction</a:t>
+            </a:r>
+          </a:p>
+        </p:txBody>
+      </p:sp>
+      <p:sp>
+        <p:nvSpPr>
+          <p:cNvPr id="3" name="Content Placeholder 2">
+            <a:extLst>
+              <a:ext uri="{FF2B5EF4-FFF2-40B4-BE49-F238E27FC236}">
+                <a16:creationId xmlns:a16="http://schemas.microsoft.com/office/drawing/2014/main" id="{B2F95D11-F0E2-B641-8750-87735D1C2821}"/>
+              </a:ext>
+            </a:extLst>
+          </p:cNvPr>
+          <p:cNvSpPr>
+            <a:spLocks noGrp="1"/>
+          </p:cNvSpPr>
+          <p:nvPr>
+            <p:ph idx="1"/>
+          </p:nvPr>
+        </p:nvSpPr>
+        <p:spPr>
+          <a:xfrm>
+            <a:off x="655320" y="2112886"/>
+            <a:ext cx="9013052" cy="3858884"/>
+          </a:xfrm>
+        </p:spPr>
+        <p:txBody>
+          <a:bodyPr>
+            <a:normAutofit/>
+          </a:bodyPr>
+          <a:lstStyle/>
+          <a:p>
+            <a:pPr marL="0" indent="0">
+              <a:buNone/>
+            </a:pPr>
+            <a:r>
+              <a:rPr lang="en-US" sz="2000" dirty="0"/>
+              <a:t>For our project, our team decided to work on a topic that is dear to our hearts/stomachs.....food.  This lead to a discussion on which restaurants we liked and hated.  This discussion was what sparked the idea for our project.   </a:t>
+            </a:r>
+          </a:p>
+          <a:p>
+            <a:pPr marL="0" indent="0">
+              <a:buNone/>
+            </a:pPr>
+            <a:r>
+              <a:rPr lang="en-US" sz="2000" dirty="0"/>
+              <a:t>For many of us, we pick a restaurant based on word of mouth or on positive review online.  Earlier this year, Yelp, a popular restaurant review site,  added a restaurants’ health inspection score/grade to the restaurant’s review page. </a:t>
+            </a:r>
+          </a:p>
+          <a:p>
+            <a:pPr marL="0" indent="0">
+              <a:buNone/>
+            </a:pPr>
+            <a:r>
+              <a:rPr lang="en-US" sz="2000" dirty="0"/>
+              <a:t>With this new information now readily available, we wanted to see if this would have an impact on restaurant's popularity. </a:t>
+            </a:r>
+          </a:p>
+        </p:txBody>
+      </p:sp>
+    </p:spTree>
+    <p:extLst>
+      <p:ext uri="{BB962C8B-B14F-4D97-AF65-F5344CB8AC3E}">
+        <p14:creationId xmlns:p14="http://schemas.microsoft.com/office/powerpoint/2010/main" val="4029635826"/>
+      </p:ext>
+    </p:extLst>
+  </p:cSld>
+  <p:clrMapOvr>
+    <a:overrideClrMapping bg1="dk1" tx1="lt1" bg2="dk2" tx2="lt2" accent1="accent1" accent2="accent2" accent3="accent3" accent4="accent4" accent5="accent5" accent6="accent6" hlink="hlink" folHlink="folHlink"/>
+  </p:clrMapOvr>
+</p:sld>
+</file>
+
+<file path=ppt/slides/slide3.xml><?xml version="1.0" encoding="utf-8"?>
+<p:sld xmlns:a="http://schemas.openxmlformats.org/drawingml/2006/main" xmlns:r="http://schemas.openxmlformats.org/officeDocument/2006/relationships" xmlns:p="http://schemas.openxmlformats.org/presentationml/2006/main">
+  <p:cSld>
+    <p:bg>
+      <p:bgPr>
+        <a:solidFill>
+          <a:schemeClr val="bg1"/>
+        </a:solidFill>
+        <a:effectLst/>
+      </p:bgPr>
+    </p:bg>
+    <p:spTree>
+      <p:nvGrpSpPr>
+        <p:cNvPr id="1" name=""/>
+        <p:cNvGrpSpPr/>
+        <p:nvPr/>
+      </p:nvGrpSpPr>
+      <p:grpSpPr>
+        <a:xfrm>
+          <a:off x="0" y="0"/>
+          <a:ext cx="0" cy="0"/>
+          <a:chOff x="0" y="0"/>
+          <a:chExt cx="0" cy="0"/>
+        </a:xfrm>
+      </p:grpSpPr>
+      <p:sp>
+        <p:nvSpPr>
+          <p:cNvPr id="40" name="Rectangle 39">
+            <a:extLst>
+              <a:ext uri="{FF2B5EF4-FFF2-40B4-BE49-F238E27FC236}">
+                <a16:creationId xmlns:a16="http://schemas.microsoft.com/office/drawing/2014/main" id="{EB181E26-89C4-4A14-92DE-0F4C4B0E9484}"/>
+              </a:ext>
+              <a:ext uri="{C183D7F6-B498-43B3-948B-1728B52AA6E4}">
+                <adec:decorative xmlns:adec="http://schemas.microsoft.com/office/drawing/2017/decorative" val="1"/>
+              </a:ext>
+            </a:extLst>
+          </p:cNvPr>
+          <p:cNvSpPr>
+            <a:spLocks noGrp="1" noRot="1" noChangeAspect="1" noMove="1" noResize="1" noEditPoints="1" noAdjustHandles="1" noChangeArrowheads="1" noChangeShapeType="1" noTextEdit="1"/>
+          </p:cNvSpPr>
+          <p:nvPr>
+            <p:extLst>
+              <p:ext uri="{386F3935-93C4-4BCD-93E2-E3B085C9AB24}">
+                <p16:designElem xmlns:p16="http://schemas.microsoft.com/office/powerpoint/2015/main" val="1"/>
+              </p:ext>
+            </p:extLst>
+          </p:nvPr>
+        </p:nvSpPr>
+        <p:spPr>
+          <a:xfrm>
+            <a:off x="0" y="0"/>
+            <a:ext cx="12192000" cy="6858000"/>
+          </a:xfrm>
+          <a:prstGeom prst="rect">
+            <a:avLst/>
+          </a:prstGeom>
+          <a:solidFill>
+            <a:schemeClr val="tx1"/>
+          </a:solidFill>
+          <a:ln>
+            <a:noFill/>
+          </a:ln>
+        </p:spPr>
+        <p:style>
+          <a:lnRef idx="2">
+            <a:schemeClr val="accent1">
+              <a:shade val="50000"/>
+            </a:schemeClr>
+          </a:lnRef>
+          <a:fillRef idx="1">
+            <a:schemeClr val="accent1"/>
+          </a:fillRef>
+          <a:effectRef idx="0">
+            <a:schemeClr val="accent1"/>
+          </a:effectRef>
+          <a:fontRef idx="minor">
+            <a:schemeClr val="lt1"/>
+          </a:fontRef>
+        </p:style>
+        <p:txBody>
+          <a:bodyPr rtlCol="0" anchor="ctr"/>
+          <a:lstStyle/>
+          <a:p>
+            <a:pPr algn="ctr"/>
+            <a:endParaRPr lang="en-US"/>
+          </a:p>
+        </p:txBody>
+      </p:sp>
+      <p:pic>
+        <p:nvPicPr>
+          <p:cNvPr id="18" name="Content Placeholder 10">
+            <a:extLst>
+              <a:ext uri="{FF2B5EF4-FFF2-40B4-BE49-F238E27FC236}">
+                <a16:creationId xmlns:a16="http://schemas.microsoft.com/office/drawing/2014/main" id="{4A0272B9-D0AA-DB47-93F1-5867A6DBEA51}"/>
+              </a:ext>
+            </a:extLst>
+          </p:cNvPr>
+          <p:cNvPicPr>
+            <a:picLocks noChangeAspect="1"/>
+          </p:cNvPicPr>
+          <p:nvPr/>
+        </p:nvPicPr>
+        <p:blipFill rotWithShape="1">
+          <a:blip r:embed="rId3"/>
+          <a:srcRect t="3834" r="2" b="15739"/>
+          <a:stretch/>
+        </p:blipFill>
+        <p:spPr>
+          <a:xfrm>
+            <a:off x="6587330" y="1690689"/>
+            <a:ext cx="5604670" cy="2501837"/>
+          </a:xfrm>
+          <a:custGeom>
+            <a:avLst/>
+            <a:gdLst>
+              <a:gd name="connsiteX0" fmla="*/ 1159248 w 5604670"/>
+              <a:gd name="connsiteY0" fmla="*/ 0 h 2501837"/>
+              <a:gd name="connsiteX1" fmla="*/ 5604670 w 5604670"/>
+              <a:gd name="connsiteY1" fmla="*/ 0 h 2501837"/>
+              <a:gd name="connsiteX2" fmla="*/ 5604670 w 5604670"/>
+              <a:gd name="connsiteY2" fmla="*/ 2501837 h 2501837"/>
+              <a:gd name="connsiteX3" fmla="*/ 0 w 5604670"/>
+              <a:gd name="connsiteY3" fmla="*/ 2501837 h 2501837"/>
+            </a:gdLst>
+            <a:ahLst/>
+            <a:cxnLst>
+              <a:cxn ang="0">
+                <a:pos x="connsiteX0" y="connsiteY0"/>
+              </a:cxn>
+              <a:cxn ang="0">
+                <a:pos x="connsiteX1" y="connsiteY1"/>
+              </a:cxn>
+              <a:cxn ang="0">
+                <a:pos x="connsiteX2" y="connsiteY2"/>
+              </a:cxn>
+              <a:cxn ang="0">
+                <a:pos x="connsiteX3" y="connsiteY3"/>
+              </a:cxn>
+            </a:cxnLst>
+            <a:rect l="l" t="t" r="r" b="b"/>
+            <a:pathLst>
+              <a:path w="5604670" h="2501837">
+                <a:moveTo>
+                  <a:pt x="1159248" y="0"/>
+                </a:moveTo>
+                <a:lnTo>
+                  <a:pt x="5604670" y="0"/>
+                </a:lnTo>
+                <a:lnTo>
+                  <a:pt x="5604670" y="2501837"/>
+                </a:lnTo>
+                <a:lnTo>
+                  <a:pt x="0" y="2501837"/>
+                </a:lnTo>
+                <a:close/>
+              </a:path>
+            </a:pathLst>
+          </a:custGeom>
+        </p:spPr>
+      </p:pic>
+      <p:pic>
+        <p:nvPicPr>
+          <p:cNvPr id="33" name="Content Placeholder 11">
+            <a:extLst>
+              <a:ext uri="{FF2B5EF4-FFF2-40B4-BE49-F238E27FC236}">
+                <a16:creationId xmlns:a16="http://schemas.microsoft.com/office/drawing/2014/main" id="{2BA4A8F2-727C-7D4B-AE3D-C8439924C79F}"/>
+              </a:ext>
+            </a:extLst>
+          </p:cNvPr>
+          <p:cNvPicPr>
+            <a:picLocks noChangeAspect="1"/>
+          </p:cNvPicPr>
+          <p:nvPr/>
+        </p:nvPicPr>
+        <p:blipFill rotWithShape="1">
+          <a:blip r:embed="rId4"/>
+          <a:srcRect t="16190" r="-2" b="24001"/>
+          <a:stretch/>
+        </p:blipFill>
+        <p:spPr>
+          <a:xfrm>
+            <a:off x="4791075" y="4357117"/>
+            <a:ext cx="7400925" cy="2500884"/>
+          </a:xfrm>
+          <a:custGeom>
+            <a:avLst/>
+            <a:gdLst>
+              <a:gd name="connsiteX0" fmla="*/ 1717230 w 7400925"/>
+              <a:gd name="connsiteY0" fmla="*/ 0 h 2500884"/>
+              <a:gd name="connsiteX1" fmla="*/ 7400925 w 7400925"/>
+              <a:gd name="connsiteY1" fmla="*/ 0 h 2500884"/>
+              <a:gd name="connsiteX2" fmla="*/ 7400925 w 7400925"/>
+              <a:gd name="connsiteY2" fmla="*/ 2500884 h 2500884"/>
+              <a:gd name="connsiteX3" fmla="*/ 0 w 7400925"/>
+              <a:gd name="connsiteY3" fmla="*/ 2500884 h 2500884"/>
+              <a:gd name="connsiteX4" fmla="*/ 0 w 7400925"/>
+              <a:gd name="connsiteY4" fmla="*/ 2500883 h 2500884"/>
+              <a:gd name="connsiteX5" fmla="*/ 552186 w 7400925"/>
+              <a:gd name="connsiteY5" fmla="*/ 2500883 h 2500884"/>
+              <a:gd name="connsiteX6" fmla="*/ 558423 w 7400925"/>
+              <a:gd name="connsiteY6" fmla="*/ 2500883 h 2500884"/>
+            </a:gdLst>
+            <a:ahLst/>
+            <a:cxnLst>
+              <a:cxn ang="0">
+                <a:pos x="connsiteX0" y="connsiteY0"/>
+              </a:cxn>
+              <a:cxn ang="0">
+                <a:pos x="connsiteX1" y="connsiteY1"/>
+              </a:cxn>
+              <a:cxn ang="0">
+                <a:pos x="connsiteX2" y="connsiteY2"/>
+              </a:cxn>
+              <a:cxn ang="0">
+                <a:pos x="connsiteX3" y="connsiteY3"/>
+              </a:cxn>
+              <a:cxn ang="0">
+                <a:pos x="connsiteX4" y="connsiteY4"/>
+              </a:cxn>
+              <a:cxn ang="0">
+                <a:pos x="connsiteX5" y="connsiteY5"/>
+              </a:cxn>
+              <a:cxn ang="0">
+                <a:pos x="connsiteX6" y="connsiteY6"/>
+              </a:cxn>
+            </a:cxnLst>
+            <a:rect l="l" t="t" r="r" b="b"/>
+            <a:pathLst>
+              <a:path w="7400925" h="2500884">
+                <a:moveTo>
+                  <a:pt x="1717230" y="0"/>
+                </a:moveTo>
+                <a:lnTo>
+                  <a:pt x="7400925" y="0"/>
+                </a:lnTo>
+                <a:lnTo>
+                  <a:pt x="7400925" y="2500884"/>
+                </a:lnTo>
+                <a:lnTo>
+                  <a:pt x="0" y="2500884"/>
+                </a:lnTo>
+                <a:lnTo>
+                  <a:pt x="0" y="2500883"/>
+                </a:lnTo>
+                <a:lnTo>
+                  <a:pt x="552186" y="2500883"/>
+                </a:lnTo>
+                <a:lnTo>
+                  <a:pt x="558423" y="2500883"/>
+                </a:lnTo>
+                <a:close/>
+              </a:path>
+            </a:pathLst>
+          </a:custGeom>
+        </p:spPr>
+      </p:pic>
+      <p:sp>
+        <p:nvSpPr>
+          <p:cNvPr id="42" name="Freeform 37">
+            <a:extLst>
+              <a:ext uri="{FF2B5EF4-FFF2-40B4-BE49-F238E27FC236}">
+                <a16:creationId xmlns:a16="http://schemas.microsoft.com/office/drawing/2014/main" id="{13958066-7CBD-4B89-8F46-614C4F28BCF9}"/>
+              </a:ext>
+              <a:ext uri="{C183D7F6-B498-43B3-948B-1728B52AA6E4}">
+                <adec:decorative xmlns:adec="http://schemas.microsoft.com/office/drawing/2017/decorative" val="1"/>
+              </a:ext>
+            </a:extLst>
+          </p:cNvPr>
+          <p:cNvSpPr>
+            <a:spLocks noGrp="1" noRot="1" noChangeAspect="1" noMove="1" noResize="1" noEditPoints="1" noAdjustHandles="1" noChangeArrowheads="1" noChangeShapeType="1" noTextEdit="1"/>
+          </p:cNvSpPr>
+          <p:nvPr>
+            <p:extLst>
+              <p:ext uri="{386F3935-93C4-4BCD-93E2-E3B085C9AB24}">
+                <p16:designElem xmlns:p16="http://schemas.microsoft.com/office/powerpoint/2015/main" val="1"/>
+              </p:ext>
+            </p:extLst>
+          </p:nvPr>
+        </p:nvSpPr>
+        <p:spPr>
+          <a:xfrm flipV="1">
+            <a:off x="0" y="1691641"/>
+            <a:ext cx="7571262" cy="5166360"/>
+          </a:xfrm>
+          <a:custGeom>
+            <a:avLst/>
+            <a:gdLst>
+              <a:gd name="connsiteX0" fmla="*/ 0 w 7571262"/>
+              <a:gd name="connsiteY0" fmla="*/ 5166360 h 5166360"/>
+              <a:gd name="connsiteX1" fmla="*/ 7571262 w 7571262"/>
+              <a:gd name="connsiteY1" fmla="*/ 5166360 h 5166360"/>
+              <a:gd name="connsiteX2" fmla="*/ 5177382 w 7571262"/>
+              <a:gd name="connsiteY2" fmla="*/ 0 h 5166360"/>
+              <a:gd name="connsiteX3" fmla="*/ 5171159 w 7571262"/>
+              <a:gd name="connsiteY3" fmla="*/ 0 h 5166360"/>
+              <a:gd name="connsiteX4" fmla="*/ 3981368 w 7571262"/>
+              <a:gd name="connsiteY4" fmla="*/ 0 h 5166360"/>
+              <a:gd name="connsiteX5" fmla="*/ 2331323 w 7571262"/>
+              <a:gd name="connsiteY5" fmla="*/ 0 h 5166360"/>
+              <a:gd name="connsiteX6" fmla="*/ 0 w 7571262"/>
+              <a:gd name="connsiteY6" fmla="*/ 0 h 5166360"/>
+            </a:gdLst>
+            <a:ahLst/>
+            <a:cxnLst>
+              <a:cxn ang="0">
+                <a:pos x="connsiteX0" y="connsiteY0"/>
+              </a:cxn>
+              <a:cxn ang="0">
+                <a:pos x="connsiteX1" y="connsiteY1"/>
+              </a:cxn>
+              <a:cxn ang="0">
+                <a:pos x="connsiteX2" y="connsiteY2"/>
+              </a:cxn>
+              <a:cxn ang="0">
+                <a:pos x="connsiteX3" y="connsiteY3"/>
+              </a:cxn>
+              <a:cxn ang="0">
+                <a:pos x="connsiteX4" y="connsiteY4"/>
+              </a:cxn>
+              <a:cxn ang="0">
+                <a:pos x="connsiteX5" y="connsiteY5"/>
+              </a:cxn>
+              <a:cxn ang="0">
+                <a:pos x="connsiteX6" y="connsiteY6"/>
+              </a:cxn>
+            </a:cxnLst>
+            <a:rect l="l" t="t" r="r" b="b"/>
+            <a:pathLst>
+              <a:path w="7571262" h="5166360">
+                <a:moveTo>
+                  <a:pt x="0" y="5166360"/>
+                </a:moveTo>
+                <a:lnTo>
+                  <a:pt x="7571262" y="5166360"/>
+                </a:lnTo>
+                <a:lnTo>
+                  <a:pt x="5177382" y="0"/>
+                </a:lnTo>
+                <a:lnTo>
+                  <a:pt x="5171159" y="0"/>
+                </a:lnTo>
+                <a:lnTo>
+                  <a:pt x="3981368" y="0"/>
+                </a:lnTo>
+                <a:lnTo>
+                  <a:pt x="2331323" y="0"/>
+                </a:lnTo>
+                <a:lnTo>
+                  <a:pt x="0" y="0"/>
+                </a:lnTo>
+                <a:close/>
+              </a:path>
+            </a:pathLst>
+          </a:custGeom>
+          <a:solidFill>
+            <a:schemeClr val="bg1">
+              <a:lumMod val="85000"/>
+              <a:lumOff val="15000"/>
+            </a:schemeClr>
+          </a:solidFill>
+          <a:ln>
+            <a:noFill/>
+          </a:ln>
+        </p:spPr>
+        <p:style>
+          <a:lnRef idx="2">
+            <a:schemeClr val="accent1">
+              <a:shade val="50000"/>
+            </a:schemeClr>
+          </a:lnRef>
+          <a:fillRef idx="1">
+            <a:schemeClr val="accent1"/>
+          </a:fillRef>
+          <a:effectRef idx="0">
+            <a:schemeClr val="accent1"/>
+          </a:effectRef>
+          <a:fontRef idx="minor">
+            <a:schemeClr val="lt1"/>
+          </a:fontRef>
+        </p:style>
+        <p:txBody>
+          <a:bodyPr wrap="square" rtlCol="0" anchor="ctr">
+            <a:noAutofit/>
+          </a:bodyPr>
+          <a:lstStyle/>
+          <a:p>
+            <a:pPr algn="ctr"/>
+            <a:endParaRPr lang="en-US"/>
+          </a:p>
+        </p:txBody>
+      </p:sp>
+      <p:sp>
+        <p:nvSpPr>
           <p:cNvPr id="5" name="Title 4">
             <a:extLst>
               <a:ext uri="{FF2B5EF4-FFF2-40B4-BE49-F238E27FC236}">
@@ -12383,36 +12456,6 @@
           </a:fontRef>
         </p:style>
       </p:cxnSp>
-      <p:pic>
-        <p:nvPicPr>
-          <p:cNvPr id="12" name="Picture 11">
-            <a:extLst>
-              <a:ext uri="{FF2B5EF4-FFF2-40B4-BE49-F238E27FC236}">
-                <a16:creationId xmlns:a16="http://schemas.microsoft.com/office/drawing/2014/main" id="{7EC57718-459A-E64C-8E5F-54488120877C}"/>
-              </a:ext>
-            </a:extLst>
-          </p:cNvPr>
-          <p:cNvPicPr>
-            <a:picLocks noChangeAspect="1"/>
-          </p:cNvPicPr>
-          <p:nvPr/>
-        </p:nvPicPr>
-        <p:blipFill>
-          <a:blip r:embed="rId3"/>
-          <a:stretch>
-            <a:fillRect/>
-          </a:stretch>
-        </p:blipFill>
-        <p:spPr>
-          <a:xfrm>
-            <a:off x="1583625" y="2426818"/>
-            <a:ext cx="2951800" cy="3997637"/>
-          </a:xfrm>
-          <a:prstGeom prst="rect">
-            <a:avLst/>
-          </a:prstGeom>
-        </p:spPr>
-      </p:pic>
       <p:cxnSp>
         <p:nvCxnSpPr>
           <p:cNvPr id="34" name="Straight Connector 33">
@@ -12480,7 +12523,7 @@
           <p:nvPr/>
         </p:nvPicPr>
         <p:blipFill>
-          <a:blip r:embed="rId4"/>
+          <a:blip r:embed="rId3"/>
           <a:stretch>
             <a:fillRect/>
           </a:stretch>
@@ -12489,6 +12532,36 @@
           <a:xfrm>
             <a:off x="6445073" y="2727482"/>
             <a:ext cx="5455917" cy="3396308"/>
+          </a:xfrm>
+          <a:prstGeom prst="rect">
+            <a:avLst/>
+          </a:prstGeom>
+        </p:spPr>
+      </p:pic>
+      <p:pic>
+        <p:nvPicPr>
+          <p:cNvPr id="2" name="Picture 1">
+            <a:extLst>
+              <a:ext uri="{FF2B5EF4-FFF2-40B4-BE49-F238E27FC236}">
+                <a16:creationId xmlns:a16="http://schemas.microsoft.com/office/drawing/2014/main" id="{6604B217-E5B8-4F65-AE5F-0B0FC7032373}"/>
+              </a:ext>
+            </a:extLst>
+          </p:cNvPr>
+          <p:cNvPicPr>
+            <a:picLocks noChangeAspect="1"/>
+          </p:cNvPicPr>
+          <p:nvPr/>
+        </p:nvPicPr>
+        <p:blipFill>
+          <a:blip r:embed="rId4"/>
+          <a:stretch>
+            <a:fillRect/>
+          </a:stretch>
+        </p:blipFill>
+        <p:spPr>
+          <a:xfrm>
+            <a:off x="546351" y="3245005"/>
+            <a:ext cx="4467225" cy="1973765"/>
           </a:xfrm>
           <a:prstGeom prst="rect">
             <a:avLst/>

</xml_diff>

<commit_message>
last edits before final
</commit_message>
<xml_diff>
--- a/GoodEats.pptx
+++ b/GoodEats.pptx
@@ -4482,7 +4482,7 @@
           <a:p>
             <a:fld id="{C51BB123-0B09-EB46-98D4-F8D58EC045A7}" type="datetimeFigureOut">
               <a:rPr lang="en-US" smtClean="0"/>
-              <a:t>12/20/2018</a:t>
+              <a:t>12/21/2018</a:t>
             </a:fld>
             <a:endParaRPr lang="en-US"/>
           </a:p>
@@ -6075,7 +6075,7 @@
           <a:p>
             <a:fld id="{60B4824A-DFEB-2C40-AA50-C7E39682DAD5}" type="datetime1">
               <a:rPr lang="en-US" smtClean="0"/>
-              <a:t>12/20/2018</a:t>
+              <a:t>12/21/2018</a:t>
             </a:fld>
             <a:endParaRPr lang="en-US"/>
           </a:p>
@@ -6273,7 +6273,7 @@
           <a:p>
             <a:fld id="{397900E7-AAFF-1845-A686-CB96BEAAF136}" type="datetime1">
               <a:rPr lang="en-US" smtClean="0"/>
-              <a:t>12/20/2018</a:t>
+              <a:t>12/21/2018</a:t>
             </a:fld>
             <a:endParaRPr lang="en-US"/>
           </a:p>
@@ -6481,7 +6481,7 @@
           <a:p>
             <a:fld id="{573F8DBA-18C0-1E42-B474-4DE96B291F35}" type="datetime1">
               <a:rPr lang="en-US" smtClean="0"/>
-              <a:t>12/20/2018</a:t>
+              <a:t>12/21/2018</a:t>
             </a:fld>
             <a:endParaRPr lang="en-US"/>
           </a:p>
@@ -6679,7 +6679,7 @@
           <a:p>
             <a:fld id="{DA1696A6-B8E5-204B-91D4-755039DCA6AB}" type="datetime1">
               <a:rPr lang="en-US" smtClean="0"/>
-              <a:t>12/20/2018</a:t>
+              <a:t>12/21/2018</a:t>
             </a:fld>
             <a:endParaRPr lang="en-US"/>
           </a:p>
@@ -6954,7 +6954,7 @@
           <a:p>
             <a:fld id="{28C7822D-3825-5249-AEE8-4BD2C3BC3662}" type="datetime1">
               <a:rPr lang="en-US" smtClean="0"/>
-              <a:t>12/20/2018</a:t>
+              <a:t>12/21/2018</a:t>
             </a:fld>
             <a:endParaRPr lang="en-US"/>
           </a:p>
@@ -7219,7 +7219,7 @@
           <a:p>
             <a:fld id="{F4A57846-EE27-1F45-89CF-2CE0364F1F6F}" type="datetime1">
               <a:rPr lang="en-US" smtClean="0"/>
-              <a:t>12/20/2018</a:t>
+              <a:t>12/21/2018</a:t>
             </a:fld>
             <a:endParaRPr lang="en-US"/>
           </a:p>
@@ -7631,7 +7631,7 @@
           <a:p>
             <a:fld id="{A52D921E-8163-424F-BB44-FDD35A83BF20}" type="datetime1">
               <a:rPr lang="en-US" smtClean="0"/>
-              <a:t>12/20/2018</a:t>
+              <a:t>12/21/2018</a:t>
             </a:fld>
             <a:endParaRPr lang="en-US"/>
           </a:p>
@@ -7772,7 +7772,7 @@
           <a:p>
             <a:fld id="{44AE0B36-D65A-5146-AEDE-E2431080023D}" type="datetime1">
               <a:rPr lang="en-US" smtClean="0"/>
-              <a:t>12/20/2018</a:t>
+              <a:t>12/21/2018</a:t>
             </a:fld>
             <a:endParaRPr lang="en-US"/>
           </a:p>
@@ -7885,7 +7885,7 @@
           <a:p>
             <a:fld id="{7CE96FDC-63E0-C845-B599-796BCB0AA20D}" type="datetime1">
               <a:rPr lang="en-US" smtClean="0"/>
-              <a:t>12/20/2018</a:t>
+              <a:t>12/21/2018</a:t>
             </a:fld>
             <a:endParaRPr lang="en-US"/>
           </a:p>
@@ -8196,7 +8196,7 @@
           <a:p>
             <a:fld id="{33BE1139-EE0A-B743-AE2E-10B415E2935A}" type="datetime1">
               <a:rPr lang="en-US" smtClean="0"/>
-              <a:t>12/20/2018</a:t>
+              <a:t>12/21/2018</a:t>
             </a:fld>
             <a:endParaRPr lang="en-US"/>
           </a:p>
@@ -8484,7 +8484,7 @@
           <a:p>
             <a:fld id="{51D5ACAB-B639-5C46-B541-23A20A3E16A7}" type="datetime1">
               <a:rPr lang="en-US" smtClean="0"/>
-              <a:t>12/20/2018</a:t>
+              <a:t>12/21/2018</a:t>
             </a:fld>
             <a:endParaRPr lang="en-US"/>
           </a:p>
@@ -8725,7 +8725,7 @@
           <a:p>
             <a:fld id="{990BEA74-AB5A-FE48-BACB-FB6227ECB83B}" type="datetime1">
               <a:rPr lang="en-US" smtClean="0"/>
-              <a:t>12/20/2018</a:t>
+              <a:t>12/21/2018</a:t>
             </a:fld>
             <a:endParaRPr lang="en-US"/>
           </a:p>
@@ -11099,44 +11099,6 @@
       </p:sp>
       <p:pic>
         <p:nvPicPr>
-          <p:cNvPr id="10" name="Picture 9">
-            <a:extLst>
-              <a:ext uri="{FF2B5EF4-FFF2-40B4-BE49-F238E27FC236}">
-                <a16:creationId xmlns:a16="http://schemas.microsoft.com/office/drawing/2014/main" id="{336E24FD-D55C-4F0A-B464-FFEDFC17BBA2}"/>
-              </a:ext>
-            </a:extLst>
-          </p:cNvPr>
-          <p:cNvPicPr>
-            <a:picLocks noChangeAspect="1"/>
-          </p:cNvPicPr>
-          <p:nvPr/>
-        </p:nvPicPr>
-        <p:blipFill>
-          <a:blip r:embed="rId2"/>
-          <a:stretch>
-            <a:fillRect/>
-          </a:stretch>
-        </p:blipFill>
-        <p:spPr>
-          <a:xfrm>
-            <a:off x="8848801" y="2734381"/>
-            <a:ext cx="594804" cy="594804"/>
-          </a:xfrm>
-          <a:prstGeom prst="rect">
-            <a:avLst/>
-          </a:prstGeom>
-          <a:ln>
-            <a:solidFill>
-              <a:schemeClr val="accent4">
-                <a:lumMod val="60000"/>
-                <a:lumOff val="40000"/>
-              </a:schemeClr>
-            </a:solidFill>
-          </a:ln>
-        </p:spPr>
-      </p:pic>
-      <p:pic>
-        <p:nvPicPr>
           <p:cNvPr id="23" name="Content Placeholder 22">
             <a:extLst>
               <a:ext uri="{FF2B5EF4-FFF2-40B4-BE49-F238E27FC236}">
@@ -11152,7 +11114,7 @@
           </p:nvPr>
         </p:nvPicPr>
         <p:blipFill>
-          <a:blip r:embed="rId3"/>
+          <a:blip r:embed="rId2"/>
           <a:stretch>
             <a:fillRect/>
           </a:stretch>
@@ -11175,13 +11137,14 @@
           </p:cNvPr>
           <p:cNvCxnSpPr>
             <a:cxnSpLocks/>
+            <a:stCxn id="14" idx="1"/>
           </p:cNvCxnSpPr>
           <p:nvPr/>
         </p:nvCxnSpPr>
         <p:spPr>
           <a:xfrm flipH="1" flipV="1">
-            <a:off x="7288567" y="2654423"/>
-            <a:ext cx="1524659" cy="377360"/>
+            <a:off x="7269096" y="2694402"/>
+            <a:ext cx="264653" cy="207918"/>
           </a:xfrm>
           <a:prstGeom prst="straightConnector1">
             <a:avLst/>
@@ -11208,6 +11171,123 @@
           </a:fontRef>
         </p:style>
       </p:cxnSp>
+      <p:pic>
+        <p:nvPicPr>
+          <p:cNvPr id="4" name="Picture 3">
+            <a:extLst>
+              <a:ext uri="{FF2B5EF4-FFF2-40B4-BE49-F238E27FC236}">
+                <a16:creationId xmlns:a16="http://schemas.microsoft.com/office/drawing/2014/main" id="{8CB21155-38C4-4B31-A9AC-1AE87AAA62AF}"/>
+              </a:ext>
+            </a:extLst>
+          </p:cNvPr>
+          <p:cNvPicPr>
+            <a:picLocks noChangeAspect="1"/>
+          </p:cNvPicPr>
+          <p:nvPr/>
+        </p:nvPicPr>
+        <p:blipFill>
+          <a:blip r:embed="rId3"/>
+          <a:stretch>
+            <a:fillRect/>
+          </a:stretch>
+        </p:blipFill>
+        <p:spPr>
+          <a:xfrm>
+            <a:off x="4001605" y="3905827"/>
+            <a:ext cx="719198" cy="279885"/>
+          </a:xfrm>
+          <a:prstGeom prst="rect">
+            <a:avLst/>
+          </a:prstGeom>
+          <a:ln>
+            <a:solidFill>
+              <a:srgbClr val="FF0000"/>
+            </a:solidFill>
+          </a:ln>
+        </p:spPr>
+      </p:pic>
+      <p:cxnSp>
+        <p:nvCxnSpPr>
+          <p:cNvPr id="6" name="Straight Arrow Connector 5">
+            <a:extLst>
+              <a:ext uri="{FF2B5EF4-FFF2-40B4-BE49-F238E27FC236}">
+                <a16:creationId xmlns:a16="http://schemas.microsoft.com/office/drawing/2014/main" id="{E41CFF85-725B-4CA6-986C-16317B01B0B2}"/>
+              </a:ext>
+            </a:extLst>
+          </p:cNvPr>
+          <p:cNvCxnSpPr>
+            <a:cxnSpLocks/>
+          </p:cNvCxnSpPr>
+          <p:nvPr/>
+        </p:nvCxnSpPr>
+        <p:spPr>
+          <a:xfrm flipH="1">
+            <a:off x="4011066" y="4185712"/>
+            <a:ext cx="99892" cy="794305"/>
+          </a:xfrm>
+          <a:prstGeom prst="straightConnector1">
+            <a:avLst/>
+          </a:prstGeom>
+          <a:ln>
+            <a:solidFill>
+              <a:srgbClr val="FF0000"/>
+            </a:solidFill>
+            <a:tailEnd type="triangle"/>
+          </a:ln>
+        </p:spPr>
+        <p:style>
+          <a:lnRef idx="1">
+            <a:schemeClr val="accent1"/>
+          </a:lnRef>
+          <a:fillRef idx="0">
+            <a:schemeClr val="accent1"/>
+          </a:fillRef>
+          <a:effectRef idx="0">
+            <a:schemeClr val="accent1"/>
+          </a:effectRef>
+          <a:fontRef idx="minor">
+            <a:schemeClr val="tx1"/>
+          </a:fontRef>
+        </p:style>
+      </p:cxnSp>
+      <p:pic>
+        <p:nvPicPr>
+          <p:cNvPr id="14" name="Picture 13">
+            <a:extLst>
+              <a:ext uri="{FF2B5EF4-FFF2-40B4-BE49-F238E27FC236}">
+                <a16:creationId xmlns:a16="http://schemas.microsoft.com/office/drawing/2014/main" id="{E3A7334E-C941-470E-92B1-141D9131F0A3}"/>
+              </a:ext>
+            </a:extLst>
+          </p:cNvPr>
+          <p:cNvPicPr>
+            <a:picLocks noChangeAspect="1"/>
+          </p:cNvPicPr>
+          <p:nvPr/>
+        </p:nvPicPr>
+        <p:blipFill>
+          <a:blip r:embed="rId4"/>
+          <a:stretch>
+            <a:fillRect/>
+          </a:stretch>
+        </p:blipFill>
+        <p:spPr>
+          <a:xfrm>
+            <a:off x="7533749" y="2694402"/>
+            <a:ext cx="415835" cy="415835"/>
+          </a:xfrm>
+          <a:prstGeom prst="rect">
+            <a:avLst/>
+          </a:prstGeom>
+          <a:ln>
+            <a:solidFill>
+              <a:schemeClr val="accent4">
+                <a:lumMod val="60000"/>
+                <a:lumOff val="40000"/>
+              </a:schemeClr>
+            </a:solidFill>
+          </a:ln>
+        </p:spPr>
+      </p:pic>
     </p:spTree>
     <p:extLst>
       <p:ext uri="{BB962C8B-B14F-4D97-AF65-F5344CB8AC3E}">
@@ -11597,6 +11677,60 @@
           </a:prstGeom>
         </p:spPr>
       </p:pic>
+      <p:sp>
+        <p:nvSpPr>
+          <p:cNvPr id="3" name="Rectangle 2">
+            <a:extLst>
+              <a:ext uri="{FF2B5EF4-FFF2-40B4-BE49-F238E27FC236}">
+                <a16:creationId xmlns:a16="http://schemas.microsoft.com/office/drawing/2014/main" id="{9247DACE-77A7-4B64-92CA-E5FF65BBEBBD}"/>
+              </a:ext>
+            </a:extLst>
+          </p:cNvPr>
+          <p:cNvSpPr/>
+          <p:nvPr/>
+        </p:nvSpPr>
+        <p:spPr>
+          <a:xfrm>
+            <a:off x="405245" y="3214760"/>
+            <a:ext cx="2541683" cy="1722268"/>
+          </a:xfrm>
+          <a:prstGeom prst="rect">
+            <a:avLst/>
+          </a:prstGeom>
+          <a:noFill/>
+        </p:spPr>
+        <p:style>
+          <a:lnRef idx="2">
+            <a:schemeClr val="accent1">
+              <a:shade val="50000"/>
+            </a:schemeClr>
+          </a:lnRef>
+          <a:fillRef idx="1">
+            <a:schemeClr val="accent1"/>
+          </a:fillRef>
+          <a:effectRef idx="0">
+            <a:schemeClr val="accent1"/>
+          </a:effectRef>
+          <a:fontRef idx="minor">
+            <a:schemeClr val="lt1"/>
+          </a:fontRef>
+        </p:style>
+        <p:txBody>
+          <a:bodyPr rtlCol="0" anchor="ctr"/>
+          <a:lstStyle/>
+          <a:p>
+            <a:pPr algn="ctr"/>
+            <a:r>
+              <a:rPr lang="en-US" dirty="0"/>
+              <a:t>No correlation between health score and ratings.</a:t>
+            </a:r>
+          </a:p>
+          <a:p>
+            <a:pPr algn="ctr"/>
+            <a:endParaRPr lang="en-US" dirty="0"/>
+          </a:p>
+        </p:txBody>
+      </p:sp>
     </p:spTree>
     <p:extLst>
       <p:ext uri="{BB962C8B-B14F-4D97-AF65-F5344CB8AC3E}">
@@ -12764,6 +12898,60 @@
           </a:prstGeom>
         </p:spPr>
       </p:pic>
+      <p:sp>
+        <p:nvSpPr>
+          <p:cNvPr id="3" name="Rectangle 2">
+            <a:extLst>
+              <a:ext uri="{FF2B5EF4-FFF2-40B4-BE49-F238E27FC236}">
+                <a16:creationId xmlns:a16="http://schemas.microsoft.com/office/drawing/2014/main" id="{6A50C0F8-13A4-4F3B-9120-08008F0F2511}"/>
+              </a:ext>
+            </a:extLst>
+          </p:cNvPr>
+          <p:cNvSpPr/>
+          <p:nvPr/>
+        </p:nvSpPr>
+        <p:spPr>
+          <a:xfrm>
+            <a:off x="184417" y="2929630"/>
+            <a:ext cx="2470006" cy="2068497"/>
+          </a:xfrm>
+          <a:prstGeom prst="rect">
+            <a:avLst/>
+          </a:prstGeom>
+          <a:noFill/>
+        </p:spPr>
+        <p:style>
+          <a:lnRef idx="2">
+            <a:schemeClr val="accent1">
+              <a:shade val="50000"/>
+            </a:schemeClr>
+          </a:lnRef>
+          <a:fillRef idx="1">
+            <a:schemeClr val="accent1"/>
+          </a:fillRef>
+          <a:effectRef idx="0">
+            <a:schemeClr val="accent1"/>
+          </a:effectRef>
+          <a:fontRef idx="minor">
+            <a:schemeClr val="lt1"/>
+          </a:fontRef>
+        </p:style>
+        <p:txBody>
+          <a:bodyPr rtlCol="0" anchor="ctr"/>
+          <a:lstStyle/>
+          <a:p>
+            <a:pPr algn="ctr"/>
+            <a:r>
+              <a:rPr lang="en-US" dirty="0"/>
+              <a:t>As price increase so does the health score</a:t>
+            </a:r>
+          </a:p>
+          <a:p>
+            <a:pPr algn="ctr"/>
+            <a:endParaRPr lang="en-US" dirty="0"/>
+          </a:p>
+        </p:txBody>
+      </p:sp>
     </p:spTree>
     <p:extLst>
       <p:ext uri="{BB962C8B-B14F-4D97-AF65-F5344CB8AC3E}">
@@ -14204,7 +14392,7 @@
         </p:nvSpPr>
         <p:spPr>
           <a:xfrm>
-            <a:off x="838200" y="2015406"/>
+            <a:off x="452507" y="2544068"/>
             <a:ext cx="5097779" cy="4065986"/>
           </a:xfrm>
         </p:spPr>
@@ -14217,13 +14405,6 @@
             <a:r>
               <a:rPr lang="en-US" sz="2000" dirty="0"/>
               <a:t>What is the correlation between restaurant inspection grades and popularity of the restaurant (number of Yelp reviews)?</a:t>
-            </a:r>
-          </a:p>
-          <a:p>
-            <a:pPr lvl="0"/>
-            <a:r>
-              <a:rPr lang="en-US" sz="2000" dirty="0"/>
-              <a:t>At what point in the inspection grade scale does the Yelp rating get impacted?</a:t>
             </a:r>
           </a:p>
           <a:p>
@@ -14592,7 +14773,7 @@
             </a:pPr>
             <a:r>
               <a:rPr lang="en-US" sz="1800" dirty="0"/>
-              <a:t>If a restaurant has a higher health score, then it would be more popular  then a restaurant with a lower health score grade. </a:t>
+              <a:t>The health score rating of a restaurant has a direct correlation to its popularity.</a:t>
             </a:r>
           </a:p>
           <a:p>
@@ -14602,7 +14783,7 @@
             </a:pPr>
             <a:r>
               <a:rPr lang="en-US" sz="1800" dirty="0"/>
-              <a:t>The higher the price of a restaurant, the higher chance it will have a higher health grade. </a:t>
+              <a:t>As the price point of a restaurant goes up, the health score rating will also go up.</a:t>
             </a:r>
           </a:p>
           <a:p>
@@ -14612,7 +14793,17 @@
             </a:pPr>
             <a:r>
               <a:rPr lang="en-US" sz="1800" dirty="0"/>
-              <a:t>The most common grade is “B” while the cleanliest type of restaurant serves French food.</a:t>
+              <a:t>The most common health score grade is a “B”</a:t>
+            </a:r>
+          </a:p>
+          <a:p>
+            <a:pPr indent="-228600">
+              <a:buFont typeface="Arial" panose="020B0604020202020204" pitchFamily="34" charset="0"/>
+              <a:buChar char="•"/>
+            </a:pPr>
+            <a:r>
+              <a:rPr lang="en-US" sz="1800" dirty="0"/>
+              <a:t>The most cleanliest type of restaurant serve French food. </a:t>
             </a:r>
           </a:p>
         </p:txBody>
@@ -16235,7 +16426,7 @@
         </p:spPr>
         <p:txBody>
           <a:bodyPr vert="horz" lIns="91440" tIns="45720" rIns="91440" bIns="45720" rtlCol="0">
-            <a:normAutofit fontScale="92500" lnSpcReduction="20000"/>
+            <a:normAutofit fontScale="62500" lnSpcReduction="20000"/>
           </a:bodyPr>
           <a:lstStyle/>
           <a:p>
@@ -16245,7 +16436,7 @@
             </a:pPr>
             <a:r>
               <a:rPr lang="en-US" sz="2000" dirty="0"/>
-              <a:t>Original data set</a:t>
+              <a:t>Original Data Set</a:t>
             </a:r>
           </a:p>
           <a:p>
@@ -16405,7 +16596,7 @@
             </a:pPr>
             <a:r>
               <a:rPr lang="en-US" sz="2200" dirty="0"/>
-              <a:t>Final data set</a:t>
+              <a:t>Random Sample Set</a:t>
             </a:r>
           </a:p>
           <a:p>
@@ -16414,12 +16605,70 @@
               <a:buChar char="•"/>
             </a:pPr>
             <a:r>
-              <a:rPr lang="en-US" sz="2000" dirty="0">
+              <a:rPr lang="en-US" sz="1800" dirty="0"/>
+              <a:t>5000</a:t>
+            </a:r>
+          </a:p>
+          <a:p>
+            <a:pPr marL="285750" indent="-228600">
+              <a:buFont typeface="Arial" panose="020B0604020202020204" pitchFamily="34" charset="0"/>
+              <a:buChar char="•"/>
+            </a:pPr>
+            <a:r>
+              <a:rPr lang="en-US" sz="2200" dirty="0"/>
+              <a:t>Further Cleaning</a:t>
+            </a:r>
+          </a:p>
+          <a:p>
+            <a:pPr marL="742950" lvl="1" indent="-228600">
+              <a:buFont typeface="Arial" panose="020B0604020202020204" pitchFamily="34" charset="0"/>
+              <a:buChar char="•"/>
+            </a:pPr>
+            <a:r>
+              <a:rPr lang="en-US" sz="2000" dirty="0"/>
+              <a:t>Dropped those that are under the 25</a:t>
+            </a:r>
+            <a:r>
+              <a:rPr lang="en-US" sz="2000" baseline="30000" dirty="0"/>
+              <a:t>th</a:t>
+            </a:r>
+            <a:r>
+              <a:rPr lang="en-US" sz="2000" dirty="0"/>
+              <a:t> percentile</a:t>
+            </a:r>
+          </a:p>
+          <a:p>
+            <a:pPr marL="1200150" lvl="2" indent="-228600">
+              <a:buFont typeface="Arial" panose="020B0604020202020204" pitchFamily="34" charset="0"/>
+              <a:buChar char="•"/>
+            </a:pPr>
+            <a:r>
+              <a:rPr lang="en-US" sz="1800" dirty="0"/>
+              <a:t>Dropped 1,267</a:t>
+            </a:r>
+          </a:p>
+          <a:p>
+            <a:pPr marL="285750" indent="-228600">
+              <a:buFont typeface="Arial" panose="020B0604020202020204" pitchFamily="34" charset="0"/>
+              <a:buChar char="•"/>
+            </a:pPr>
+            <a:r>
+              <a:rPr lang="en-US" sz="2200" dirty="0"/>
+              <a:t>Final data set</a:t>
+            </a:r>
+          </a:p>
+          <a:p>
+            <a:pPr marL="742950" lvl="1" indent="-228600">
+              <a:buFont typeface="Arial" panose="020B0604020202020204" pitchFamily="34" charset="0"/>
+              <a:buChar char="•"/>
+            </a:pPr>
+            <a:r>
+              <a:rPr lang="en-US" sz="2000" b="1" u="sng" dirty="0">
                 <a:solidFill>
                   <a:srgbClr val="00B050"/>
                 </a:solidFill>
               </a:rPr>
-              <a:t>22,512 restaurants</a:t>
+              <a:t>3,733 restaurants</a:t>
             </a:r>
           </a:p>
           <a:p>

</xml_diff>